<commit_message>
Add standards organization descriptions
</commit_message>
<xml_diff>
--- a/_original_documents/Education Standards Matrix.pptx
+++ b/_original_documents/Education Standards Matrix.pptx
@@ -5,13 +5,14 @@
     <p:sldMasterId id="2147483648" r:id="rId1"/>
   </p:sldMasterIdLst>
   <p:notesMasterIdLst>
-    <p:notesMasterId r:id="rId6"/>
+    <p:notesMasterId r:id="rId7"/>
   </p:notesMasterIdLst>
   <p:sldIdLst>
     <p:sldId id="267" r:id="rId2"/>
-    <p:sldId id="268" r:id="rId3"/>
-    <p:sldId id="269" r:id="rId4"/>
-    <p:sldId id="266" r:id="rId5"/>
+    <p:sldId id="270" r:id="rId3"/>
+    <p:sldId id="268" r:id="rId4"/>
+    <p:sldId id="269" r:id="rId5"/>
+    <p:sldId id="266" r:id="rId6"/>
   </p:sldIdLst>
   <p:sldSz cx="9144000" cy="6858000" type="screen4x3"/>
   <p:notesSz cx="6858000" cy="9144000"/>
@@ -1205,7 +1206,7 @@
           <a:p>
             <a:fld id="{9C9F9EC7-349F-459A-9F47-7E248F9FA12F}" type="datetimeFigureOut">
               <a:rPr lang="en-US" smtClean="0"/>
-              <a:t>2019-05-18</a:t>
+              <a:t>2019-11-19</a:t>
             </a:fld>
             <a:endParaRPr lang="en-US"/>
           </a:p>
@@ -1630,7 +1631,7 @@
     </p:spTree>
     <p:extLst>
       <p:ext uri="{BB962C8B-B14F-4D97-AF65-F5344CB8AC3E}">
-        <p14:creationId xmlns:p14="http://schemas.microsoft.com/office/powerpoint/2010/main" val="591680154"/>
+        <p14:creationId xmlns:p14="http://schemas.microsoft.com/office/powerpoint/2010/main" val="1659862370"/>
       </p:ext>
     </p:extLst>
   </p:cSld>
@@ -1706,6 +1707,90 @@
             <a:fld id="{EAF55101-EEB9-4B4E-9527-9E942F38658C}" type="slidenum">
               <a:rPr lang="en-US" smtClean="0"/>
               <a:t>3</a:t>
+            </a:fld>
+            <a:endParaRPr lang="en-US"/>
+          </a:p>
+        </p:txBody>
+      </p:sp>
+    </p:spTree>
+    <p:extLst>
+      <p:ext uri="{BB962C8B-B14F-4D97-AF65-F5344CB8AC3E}">
+        <p14:creationId xmlns:p14="http://schemas.microsoft.com/office/powerpoint/2010/main" val="591680154"/>
+      </p:ext>
+    </p:extLst>
+  </p:cSld>
+  <p:clrMapOvr>
+    <a:masterClrMapping/>
+  </p:clrMapOvr>
+</p:notes>
+</file>
+
+<file path=ppt/notesSlides/notesSlide4.xml><?xml version="1.0" encoding="utf-8"?>
+<p:notes xmlns:a="http://schemas.openxmlformats.org/drawingml/2006/main" xmlns:r="http://schemas.openxmlformats.org/officeDocument/2006/relationships" xmlns:p="http://schemas.openxmlformats.org/presentationml/2006/main">
+  <p:cSld>
+    <p:spTree>
+      <p:nvGrpSpPr>
+        <p:cNvPr id="1" name=""/>
+        <p:cNvGrpSpPr/>
+        <p:nvPr/>
+      </p:nvGrpSpPr>
+      <p:grpSpPr>
+        <a:xfrm>
+          <a:off x="0" y="0"/>
+          <a:ext cx="0" cy="0"/>
+          <a:chOff x="0" y="0"/>
+          <a:chExt cx="0" cy="0"/>
+        </a:xfrm>
+      </p:grpSpPr>
+      <p:sp>
+        <p:nvSpPr>
+          <p:cNvPr id="2" name="Slide Image Placeholder 1"/>
+          <p:cNvSpPr>
+            <a:spLocks noGrp="1" noRot="1" noChangeAspect="1"/>
+          </p:cNvSpPr>
+          <p:nvPr>
+            <p:ph type="sldImg"/>
+          </p:nvPr>
+        </p:nvSpPr>
+        <p:spPr/>
+      </p:sp>
+      <p:sp>
+        <p:nvSpPr>
+          <p:cNvPr id="3" name="Notes Placeholder 2"/>
+          <p:cNvSpPr>
+            <a:spLocks noGrp="1"/>
+          </p:cNvSpPr>
+          <p:nvPr>
+            <p:ph type="body" idx="1"/>
+          </p:nvPr>
+        </p:nvSpPr>
+        <p:spPr/>
+        <p:txBody>
+          <a:bodyPr/>
+          <a:lstStyle/>
+          <a:p>
+            <a:endParaRPr lang="en-US" dirty="0"/>
+          </a:p>
+        </p:txBody>
+      </p:sp>
+      <p:sp>
+        <p:nvSpPr>
+          <p:cNvPr id="4" name="Slide Number Placeholder 3"/>
+          <p:cNvSpPr>
+            <a:spLocks noGrp="1"/>
+          </p:cNvSpPr>
+          <p:nvPr>
+            <p:ph type="sldNum" sz="quarter" idx="10"/>
+          </p:nvPr>
+        </p:nvSpPr>
+        <p:spPr/>
+        <p:txBody>
+          <a:bodyPr/>
+          <a:lstStyle/>
+          <a:p>
+            <a:fld id="{EAF55101-EEB9-4B4E-9527-9E942F38658C}" type="slidenum">
+              <a:rPr lang="en-US" smtClean="0"/>
+              <a:t>4</a:t>
             </a:fld>
             <a:endParaRPr lang="en-US"/>
           </a:p>
@@ -1903,7 +1988,7 @@
           <a:p>
             <a:fld id="{99F55C7B-28FE-444C-ADB6-C5B890F92BAD}" type="datetimeFigureOut">
               <a:rPr lang="en-US" smtClean="0"/>
-              <a:t>2019-05-18</a:t>
+              <a:t>2019-11-19</a:t>
             </a:fld>
             <a:endParaRPr lang="en-US"/>
           </a:p>
@@ -2071,7 +2156,7 @@
           <a:p>
             <a:fld id="{99F55C7B-28FE-444C-ADB6-C5B890F92BAD}" type="datetimeFigureOut">
               <a:rPr lang="en-US" smtClean="0"/>
-              <a:t>2019-05-18</a:t>
+              <a:t>2019-11-19</a:t>
             </a:fld>
             <a:endParaRPr lang="en-US"/>
           </a:p>
@@ -2249,7 +2334,7 @@
           <a:p>
             <a:fld id="{99F55C7B-28FE-444C-ADB6-C5B890F92BAD}" type="datetimeFigureOut">
               <a:rPr lang="en-US" smtClean="0"/>
-              <a:t>2019-05-18</a:t>
+              <a:t>2019-11-19</a:t>
             </a:fld>
             <a:endParaRPr lang="en-US"/>
           </a:p>
@@ -2417,7 +2502,7 @@
           <a:p>
             <a:fld id="{99F55C7B-28FE-444C-ADB6-C5B890F92BAD}" type="datetimeFigureOut">
               <a:rPr lang="en-US" smtClean="0"/>
-              <a:t>2019-05-18</a:t>
+              <a:t>2019-11-19</a:t>
             </a:fld>
             <a:endParaRPr lang="en-US"/>
           </a:p>
@@ -2662,7 +2747,7 @@
           <a:p>
             <a:fld id="{99F55C7B-28FE-444C-ADB6-C5B890F92BAD}" type="datetimeFigureOut">
               <a:rPr lang="en-US" smtClean="0"/>
-              <a:t>2019-05-18</a:t>
+              <a:t>2019-11-19</a:t>
             </a:fld>
             <a:endParaRPr lang="en-US"/>
           </a:p>
@@ -2947,7 +3032,7 @@
           <a:p>
             <a:fld id="{99F55C7B-28FE-444C-ADB6-C5B890F92BAD}" type="datetimeFigureOut">
               <a:rPr lang="en-US" smtClean="0"/>
-              <a:t>2019-05-18</a:t>
+              <a:t>2019-11-19</a:t>
             </a:fld>
             <a:endParaRPr lang="en-US"/>
           </a:p>
@@ -3366,7 +3451,7 @@
           <a:p>
             <a:fld id="{99F55C7B-28FE-444C-ADB6-C5B890F92BAD}" type="datetimeFigureOut">
               <a:rPr lang="en-US" smtClean="0"/>
-              <a:t>2019-05-18</a:t>
+              <a:t>2019-11-19</a:t>
             </a:fld>
             <a:endParaRPr lang="en-US"/>
           </a:p>
@@ -3483,7 +3568,7 @@
           <a:p>
             <a:fld id="{99F55C7B-28FE-444C-ADB6-C5B890F92BAD}" type="datetimeFigureOut">
               <a:rPr lang="en-US" smtClean="0"/>
-              <a:t>2019-05-18</a:t>
+              <a:t>2019-11-19</a:t>
             </a:fld>
             <a:endParaRPr lang="en-US"/>
           </a:p>
@@ -3578,7 +3663,7 @@
           <a:p>
             <a:fld id="{99F55C7B-28FE-444C-ADB6-C5B890F92BAD}" type="datetimeFigureOut">
               <a:rPr lang="en-US" smtClean="0"/>
-              <a:t>2019-05-18</a:t>
+              <a:t>2019-11-19</a:t>
             </a:fld>
             <a:endParaRPr lang="en-US"/>
           </a:p>
@@ -3853,7 +3938,7 @@
           <a:p>
             <a:fld id="{99F55C7B-28FE-444C-ADB6-C5B890F92BAD}" type="datetimeFigureOut">
               <a:rPr lang="en-US" smtClean="0"/>
-              <a:t>2019-05-18</a:t>
+              <a:t>2019-11-19</a:t>
             </a:fld>
             <a:endParaRPr lang="en-US"/>
           </a:p>
@@ -4105,7 +4190,7 @@
           <a:p>
             <a:fld id="{99F55C7B-28FE-444C-ADB6-C5B890F92BAD}" type="datetimeFigureOut">
               <a:rPr lang="en-US" smtClean="0"/>
-              <a:t>2019-05-18</a:t>
+              <a:t>2019-11-19</a:t>
             </a:fld>
             <a:endParaRPr lang="en-US"/>
           </a:p>
@@ -4316,7 +4401,7 @@
           <a:p>
             <a:fld id="{99F55C7B-28FE-444C-ADB6-C5B890F92BAD}" type="datetimeFigureOut">
               <a:rPr lang="en-US" smtClean="0"/>
-              <a:t>2019-05-18</a:t>
+              <a:t>2019-11-19</a:t>
             </a:fld>
             <a:endParaRPr lang="en-US"/>
           </a:p>
@@ -5297,7 +5382,7 @@
                   <a:srgbClr val="000000"/>
                 </a:solidFill>
               </a:rPr>
-              <a:t>Student Data</a:t>
+              <a:t>Learner / Worker Data</a:t>
             </a:r>
           </a:p>
         </p:txBody>
@@ -5471,7 +5556,7 @@
                   <a:srgbClr val="000000"/>
                 </a:solidFill>
               </a:rPr>
-              <a:t>Competency Data Model</a:t>
+              <a:t>Competency &amp; Credential</a:t>
             </a:r>
           </a:p>
         </p:txBody>
@@ -6673,14 +6758,14 @@
         </p:nvSpPr>
         <p:spPr>
           <a:xfrm>
-            <a:off x="6553200" y="1447800"/>
-            <a:ext cx="457200" cy="228600"/>
+            <a:off x="5181600" y="1371600"/>
+            <a:ext cx="1828800" cy="266700"/>
           </a:xfrm>
           <a:prstGeom prst="roundRect">
             <a:avLst/>
           </a:prstGeom>
           <a:noFill/>
-          <a:ln w="12700">
+          <a:ln w="38100">
             <a:solidFill>
               <a:schemeClr val="tx1"/>
             </a:solidFill>
@@ -6707,12 +6792,12 @@
           <a:lstStyle/>
           <a:p>
             <a:r>
-              <a:rPr lang="en-US" sz="1400" dirty="0">
+              <a:rPr lang="en-US" sz="1600" b="1" dirty="0">
                 <a:solidFill>
                   <a:schemeClr val="tx1"/>
                 </a:solidFill>
               </a:rPr>
-              <a:t>CLR</a:t>
+              <a:t>CLR/ILR</a:t>
             </a:r>
           </a:p>
         </p:txBody>
@@ -6731,7 +6816,7 @@
         </p:nvSpPr>
         <p:spPr>
           <a:xfrm>
-            <a:off x="4953000" y="3581400"/>
+            <a:off x="4953000" y="3429000"/>
             <a:ext cx="3352800" cy="228600"/>
           </a:xfrm>
           <a:prstGeom prst="roundRect">
@@ -7701,6 +7786,195 @@
               <a:t>http://www.edmatrix.org/matrix.html</a:t>
             </a:r>
             <a:endParaRPr lang="en-US" sz="2400" b="1" dirty="0"/>
+          </a:p>
+        </p:txBody>
+      </p:sp>
+      <p:sp>
+        <p:nvSpPr>
+          <p:cNvPr id="55" name="Rounded Rectangle 20">
+            <a:extLst>
+              <a:ext uri="{FF2B5EF4-FFF2-40B4-BE49-F238E27FC236}">
+                <a16:creationId xmlns:a16="http://schemas.microsoft.com/office/drawing/2014/main" id="{8CFAFCEC-0771-4F33-B0AF-3B53E10D9AE9}"/>
+              </a:ext>
+            </a:extLst>
+          </p:cNvPr>
+          <p:cNvSpPr/>
+          <p:nvPr/>
+        </p:nvSpPr>
+        <p:spPr>
+          <a:xfrm>
+            <a:off x="3905249" y="1157764"/>
+            <a:ext cx="988605" cy="533400"/>
+          </a:xfrm>
+          <a:prstGeom prst="roundRect">
+            <a:avLst/>
+          </a:prstGeom>
+          <a:noFill/>
+          <a:ln w="38100">
+            <a:solidFill>
+              <a:schemeClr val="tx1"/>
+            </a:solidFill>
+          </a:ln>
+        </p:spPr>
+        <p:style>
+          <a:lnRef idx="2">
+            <a:schemeClr val="accent1">
+              <a:shade val="50000"/>
+            </a:schemeClr>
+          </a:lnRef>
+          <a:fillRef idx="1">
+            <a:schemeClr val="accent1"/>
+          </a:fillRef>
+          <a:effectRef idx="0">
+            <a:schemeClr val="accent1"/>
+          </a:effectRef>
+          <a:fontRef idx="minor">
+            <a:schemeClr val="lt1"/>
+          </a:fontRef>
+        </p:style>
+        <p:txBody>
+          <a:bodyPr wrap="square" lIns="45720" tIns="0" rIns="9144" bIns="0" rtlCol="0" anchor="b" anchorCtr="0"/>
+          <a:lstStyle/>
+          <a:p>
+            <a:r>
+              <a:rPr lang="en-US" sz="1600" b="1" dirty="0">
+                <a:solidFill>
+                  <a:schemeClr val="tx1"/>
+                </a:solidFill>
+              </a:rPr>
+              <a:t>HR Open</a:t>
+            </a:r>
+            <a:br>
+              <a:rPr lang="en-US" sz="1600" b="1" dirty="0">
+                <a:solidFill>
+                  <a:schemeClr val="tx1"/>
+                </a:solidFill>
+              </a:rPr>
+            </a:br>
+            <a:r>
+              <a:rPr lang="en-US" sz="1600" b="1" dirty="0">
+                <a:solidFill>
+                  <a:schemeClr val="tx1"/>
+                </a:solidFill>
+              </a:rPr>
+              <a:t>Standards</a:t>
+            </a:r>
+          </a:p>
+        </p:txBody>
+      </p:sp>
+      <p:sp>
+        <p:nvSpPr>
+          <p:cNvPr id="57" name="Rounded Rectangle 20">
+            <a:extLst>
+              <a:ext uri="{FF2B5EF4-FFF2-40B4-BE49-F238E27FC236}">
+                <a16:creationId xmlns:a16="http://schemas.microsoft.com/office/drawing/2014/main" id="{BDA0C23D-F5AF-42D8-AE99-BA09A02CB9D7}"/>
+              </a:ext>
+            </a:extLst>
+          </p:cNvPr>
+          <p:cNvSpPr/>
+          <p:nvPr/>
+        </p:nvSpPr>
+        <p:spPr>
+          <a:xfrm>
+            <a:off x="5107395" y="3733800"/>
+            <a:ext cx="1979205" cy="225152"/>
+          </a:xfrm>
+          <a:prstGeom prst="roundRect">
+            <a:avLst/>
+          </a:prstGeom>
+          <a:noFill/>
+          <a:ln w="38100">
+            <a:solidFill>
+              <a:schemeClr val="tx1"/>
+            </a:solidFill>
+          </a:ln>
+        </p:spPr>
+        <p:style>
+          <a:lnRef idx="2">
+            <a:schemeClr val="accent1">
+              <a:shade val="50000"/>
+            </a:schemeClr>
+          </a:lnRef>
+          <a:fillRef idx="1">
+            <a:schemeClr val="accent1"/>
+          </a:fillRef>
+          <a:effectRef idx="0">
+            <a:schemeClr val="accent1"/>
+          </a:effectRef>
+          <a:fontRef idx="minor">
+            <a:schemeClr val="lt1"/>
+          </a:fontRef>
+        </p:style>
+        <p:txBody>
+          <a:bodyPr wrap="square" lIns="45720" tIns="0" rIns="9144" bIns="0" rtlCol="0" anchor="b" anchorCtr="0"/>
+          <a:lstStyle/>
+          <a:p>
+            <a:r>
+              <a:rPr lang="en-US" sz="1600" b="1" dirty="0">
+                <a:solidFill>
+                  <a:schemeClr val="tx1"/>
+                </a:solidFill>
+              </a:rPr>
+              <a:t>CTDL</a:t>
+            </a:r>
+          </a:p>
+        </p:txBody>
+      </p:sp>
+      <p:sp>
+        <p:nvSpPr>
+          <p:cNvPr id="59" name="Rounded Rectangle 20">
+            <a:extLst>
+              <a:ext uri="{FF2B5EF4-FFF2-40B4-BE49-F238E27FC236}">
+                <a16:creationId xmlns:a16="http://schemas.microsoft.com/office/drawing/2014/main" id="{BFE35CC7-DF75-451C-BE65-D590AE4A27FA}"/>
+              </a:ext>
+            </a:extLst>
+          </p:cNvPr>
+          <p:cNvSpPr/>
+          <p:nvPr/>
+        </p:nvSpPr>
+        <p:spPr>
+          <a:xfrm>
+            <a:off x="7848599" y="3733800"/>
+            <a:ext cx="912405" cy="225152"/>
+          </a:xfrm>
+          <a:prstGeom prst="roundRect">
+            <a:avLst/>
+          </a:prstGeom>
+          <a:noFill/>
+          <a:ln w="38100">
+            <a:solidFill>
+              <a:schemeClr val="tx1"/>
+            </a:solidFill>
+          </a:ln>
+        </p:spPr>
+        <p:style>
+          <a:lnRef idx="2">
+            <a:schemeClr val="accent1">
+              <a:shade val="50000"/>
+            </a:schemeClr>
+          </a:lnRef>
+          <a:fillRef idx="1">
+            <a:schemeClr val="accent1"/>
+          </a:fillRef>
+          <a:effectRef idx="0">
+            <a:schemeClr val="accent1"/>
+          </a:effectRef>
+          <a:fontRef idx="minor">
+            <a:schemeClr val="lt1"/>
+          </a:fontRef>
+        </p:style>
+        <p:txBody>
+          <a:bodyPr wrap="square" lIns="45720" tIns="0" rIns="9144" bIns="0" rtlCol="0" anchor="b" anchorCtr="0"/>
+          <a:lstStyle/>
+          <a:p>
+            <a:r>
+              <a:rPr lang="en-US" sz="1600" b="1" dirty="0">
+                <a:solidFill>
+                  <a:schemeClr val="tx1"/>
+                </a:solidFill>
+              </a:rPr>
+              <a:t>W3C VC</a:t>
+            </a:r>
           </a:p>
         </p:txBody>
       </p:sp>
@@ -10705,10 +10979,10 @@
       </p:sp>
       <p:sp>
         <p:nvSpPr>
-          <p:cNvPr id="53" name="TextBox 52">
+          <p:cNvPr id="12" name="TextBox 11">
             <a:extLst>
               <a:ext uri="{FF2B5EF4-FFF2-40B4-BE49-F238E27FC236}">
-                <a16:creationId xmlns:a16="http://schemas.microsoft.com/office/drawing/2014/main" id="{B4A0767D-58AE-4710-B0D3-751A4E363A4A}"/>
+                <a16:creationId xmlns:a16="http://schemas.microsoft.com/office/drawing/2014/main" id="{7D17B5E2-9D6A-417B-A080-A162458B4B63}"/>
               </a:ext>
             </a:extLst>
           </p:cNvPr>
@@ -10717,8 +10991,8 @@
         </p:nvSpPr>
         <p:spPr>
           <a:xfrm>
-            <a:off x="533400" y="457200"/>
-            <a:ext cx="3498715" cy="523220"/>
+            <a:off x="304800" y="381000"/>
+            <a:ext cx="3884205" cy="738664"/>
           </a:xfrm>
           <a:prstGeom prst="rect">
             <a:avLst/>
@@ -10732,16 +11006,25 @@
           <a:lstStyle/>
           <a:p>
             <a:r>
-              <a:rPr lang="en-US" sz="2800" b="1" dirty="0"/>
+              <a:rPr lang="en-US" sz="2400" b="1" dirty="0"/>
               <a:t>Educational Standards</a:t>
             </a:r>
+          </a:p>
+          <a:p>
+            <a:r>
+              <a:rPr lang="en-US" b="1" dirty="0">
+                <a:hlinkClick r:id="rId3"/>
+              </a:rPr>
+              <a:t>http://www.edmatrix.org/matrix.html</a:t>
+            </a:r>
+            <a:endParaRPr lang="en-US" sz="2400" b="1" dirty="0"/>
           </a:p>
         </p:txBody>
       </p:sp>
     </p:spTree>
     <p:extLst>
       <p:ext uri="{BB962C8B-B14F-4D97-AF65-F5344CB8AC3E}">
-        <p14:creationId xmlns:p14="http://schemas.microsoft.com/office/powerpoint/2010/main" val="907942164"/>
+        <p14:creationId xmlns:p14="http://schemas.microsoft.com/office/powerpoint/2010/main" val="2696841153"/>
       </p:ext>
     </p:extLst>
   </p:cSld>
@@ -10782,6 +11065,3040 @@
         </p:nvSpPr>
         <p:spPr>
           <a:xfrm>
+            <a:off x="152400" y="6096000"/>
+            <a:ext cx="4419600" cy="685800"/>
+          </a:xfrm>
+          <a:prstGeom prst="rect">
+            <a:avLst/>
+          </a:prstGeom>
+          <a:solidFill>
+            <a:srgbClr val="B0C6E1"/>
+          </a:solidFill>
+          <a:ln w="12700">
+            <a:noFill/>
+          </a:ln>
+        </p:spPr>
+        <p:style>
+          <a:lnRef idx="2">
+            <a:schemeClr val="accent1">
+              <a:shade val="50000"/>
+            </a:schemeClr>
+          </a:lnRef>
+          <a:fillRef idx="1">
+            <a:schemeClr val="accent1"/>
+          </a:fillRef>
+          <a:effectRef idx="0">
+            <a:schemeClr val="accent1"/>
+          </a:effectRef>
+          <a:fontRef idx="minor">
+            <a:schemeClr val="lt1"/>
+          </a:fontRef>
+        </p:style>
+        <p:txBody>
+          <a:bodyPr rtlCol="0" anchor="ctr"/>
+          <a:lstStyle/>
+          <a:p>
+            <a:r>
+              <a:rPr lang="en-US" dirty="0">
+                <a:solidFill>
+                  <a:srgbClr val="000000"/>
+                </a:solidFill>
+              </a:rPr>
+              <a:t>Competency</a:t>
+            </a:r>
+          </a:p>
+          <a:p>
+            <a:r>
+              <a:rPr lang="en-US" dirty="0">
+                <a:solidFill>
+                  <a:srgbClr val="000000"/>
+                </a:solidFill>
+              </a:rPr>
+              <a:t>&amp; Achievement</a:t>
+            </a:r>
+          </a:p>
+        </p:txBody>
+      </p:sp>
+      <p:sp>
+        <p:nvSpPr>
+          <p:cNvPr id="75" name="Rectangle 74">
+            <a:extLst>
+              <a:ext uri="{FF2B5EF4-FFF2-40B4-BE49-F238E27FC236}">
+                <a16:creationId xmlns:a16="http://schemas.microsoft.com/office/drawing/2014/main" id="{11B85B29-69E5-408B-B786-1456133825B7}"/>
+              </a:ext>
+            </a:extLst>
+          </p:cNvPr>
+          <p:cNvSpPr/>
+          <p:nvPr/>
+        </p:nvSpPr>
+        <p:spPr>
+          <a:xfrm>
+            <a:off x="4800600" y="6096000"/>
+            <a:ext cx="4038600" cy="685800"/>
+          </a:xfrm>
+          <a:prstGeom prst="rect">
+            <a:avLst/>
+          </a:prstGeom>
+          <a:solidFill>
+            <a:srgbClr val="B0C6E1"/>
+          </a:solidFill>
+          <a:ln w="12700">
+            <a:noFill/>
+          </a:ln>
+        </p:spPr>
+        <p:style>
+          <a:lnRef idx="2">
+            <a:schemeClr val="accent1">
+              <a:shade val="50000"/>
+            </a:schemeClr>
+          </a:lnRef>
+          <a:fillRef idx="1">
+            <a:schemeClr val="accent1"/>
+          </a:fillRef>
+          <a:effectRef idx="0">
+            <a:schemeClr val="accent1"/>
+          </a:effectRef>
+          <a:fontRef idx="minor">
+            <a:schemeClr val="lt1"/>
+          </a:fontRef>
+        </p:style>
+        <p:txBody>
+          <a:bodyPr rtlCol="0" anchor="ctr"/>
+          <a:lstStyle/>
+          <a:p>
+            <a:r>
+              <a:rPr lang="en-US" dirty="0">
+                <a:solidFill>
+                  <a:srgbClr val="000000"/>
+                </a:solidFill>
+              </a:rPr>
+              <a:t>Design</a:t>
+            </a:r>
+            <a:br>
+              <a:rPr lang="en-US" dirty="0">
+                <a:solidFill>
+                  <a:srgbClr val="000000"/>
+                </a:solidFill>
+              </a:rPr>
+            </a:br>
+            <a:r>
+              <a:rPr lang="en-US" dirty="0">
+                <a:solidFill>
+                  <a:srgbClr val="000000"/>
+                </a:solidFill>
+              </a:rPr>
+              <a:t>&amp; Practice</a:t>
+            </a:r>
+          </a:p>
+        </p:txBody>
+      </p:sp>
+      <p:sp>
+        <p:nvSpPr>
+          <p:cNvPr id="77" name="Rectangle 76">
+            <a:extLst>
+              <a:ext uri="{FF2B5EF4-FFF2-40B4-BE49-F238E27FC236}">
+                <a16:creationId xmlns:a16="http://schemas.microsoft.com/office/drawing/2014/main" id="{33E03DD4-58B8-4D84-81B8-890E74C1E17A}"/>
+              </a:ext>
+            </a:extLst>
+          </p:cNvPr>
+          <p:cNvSpPr/>
+          <p:nvPr/>
+        </p:nvSpPr>
+        <p:spPr>
+          <a:xfrm>
+            <a:off x="1295400" y="1524000"/>
+            <a:ext cx="381000" cy="1676400"/>
+          </a:xfrm>
+          <a:prstGeom prst="rect">
+            <a:avLst/>
+          </a:prstGeom>
+          <a:solidFill>
+            <a:srgbClr val="B0C6E1"/>
+          </a:solidFill>
+          <a:ln w="12700">
+            <a:noFill/>
+          </a:ln>
+        </p:spPr>
+        <p:style>
+          <a:lnRef idx="2">
+            <a:schemeClr val="accent1">
+              <a:shade val="50000"/>
+            </a:schemeClr>
+          </a:lnRef>
+          <a:fillRef idx="1">
+            <a:schemeClr val="accent1"/>
+          </a:fillRef>
+          <a:effectRef idx="0">
+            <a:schemeClr val="accent1"/>
+          </a:effectRef>
+          <a:fontRef idx="minor">
+            <a:schemeClr val="lt1"/>
+          </a:fontRef>
+        </p:style>
+        <p:txBody>
+          <a:bodyPr rtlCol="0" anchor="ctr"/>
+          <a:lstStyle/>
+          <a:p>
+            <a:endParaRPr lang="en-US">
+              <a:solidFill>
+                <a:srgbClr val="000000"/>
+              </a:solidFill>
+            </a:endParaRPr>
+          </a:p>
+        </p:txBody>
+      </p:sp>
+      <p:sp>
+        <p:nvSpPr>
+          <p:cNvPr id="78" name="Rectangle 77">
+            <a:extLst>
+              <a:ext uri="{FF2B5EF4-FFF2-40B4-BE49-F238E27FC236}">
+                <a16:creationId xmlns:a16="http://schemas.microsoft.com/office/drawing/2014/main" id="{5A6BABA4-FFD3-46EC-8366-B18DEE47420B}"/>
+              </a:ext>
+            </a:extLst>
+          </p:cNvPr>
+          <p:cNvSpPr/>
+          <p:nvPr/>
+        </p:nvSpPr>
+        <p:spPr>
+          <a:xfrm>
+            <a:off x="1295400" y="3581400"/>
+            <a:ext cx="381000" cy="1676400"/>
+          </a:xfrm>
+          <a:prstGeom prst="rect">
+            <a:avLst/>
+          </a:prstGeom>
+          <a:solidFill>
+            <a:srgbClr val="B0C6E1"/>
+          </a:solidFill>
+          <a:ln w="12700">
+            <a:noFill/>
+          </a:ln>
+        </p:spPr>
+        <p:style>
+          <a:lnRef idx="2">
+            <a:schemeClr val="accent1">
+              <a:shade val="50000"/>
+            </a:schemeClr>
+          </a:lnRef>
+          <a:fillRef idx="1">
+            <a:schemeClr val="accent1"/>
+          </a:fillRef>
+          <a:effectRef idx="0">
+            <a:schemeClr val="accent1"/>
+          </a:effectRef>
+          <a:fontRef idx="minor">
+            <a:schemeClr val="lt1"/>
+          </a:fontRef>
+        </p:style>
+        <p:txBody>
+          <a:bodyPr rtlCol="0" anchor="ctr"/>
+          <a:lstStyle/>
+          <a:p>
+            <a:endParaRPr lang="en-US">
+              <a:solidFill>
+                <a:srgbClr val="000000"/>
+              </a:solidFill>
+            </a:endParaRPr>
+          </a:p>
+        </p:txBody>
+      </p:sp>
+      <p:sp>
+        <p:nvSpPr>
+          <p:cNvPr id="79" name="Rectangle 78">
+            <a:extLst>
+              <a:ext uri="{FF2B5EF4-FFF2-40B4-BE49-F238E27FC236}">
+                <a16:creationId xmlns:a16="http://schemas.microsoft.com/office/drawing/2014/main" id="{3D5629A0-55CD-4EEB-BE29-B63359C7AC5A}"/>
+              </a:ext>
+            </a:extLst>
+          </p:cNvPr>
+          <p:cNvSpPr/>
+          <p:nvPr/>
+        </p:nvSpPr>
+        <p:spPr>
+          <a:xfrm>
+            <a:off x="533400" y="1905000"/>
+            <a:ext cx="381000" cy="4038600"/>
+          </a:xfrm>
+          <a:prstGeom prst="rect">
+            <a:avLst/>
+          </a:prstGeom>
+          <a:solidFill>
+            <a:srgbClr val="B0C6E1"/>
+          </a:solidFill>
+          <a:ln w="12700">
+            <a:noFill/>
+          </a:ln>
+        </p:spPr>
+        <p:style>
+          <a:lnRef idx="2">
+            <a:schemeClr val="accent1">
+              <a:shade val="50000"/>
+            </a:schemeClr>
+          </a:lnRef>
+          <a:fillRef idx="1">
+            <a:schemeClr val="accent1"/>
+          </a:fillRef>
+          <a:effectRef idx="0">
+            <a:schemeClr val="accent1"/>
+          </a:effectRef>
+          <a:fontRef idx="minor">
+            <a:schemeClr val="lt1"/>
+          </a:fontRef>
+        </p:style>
+        <p:txBody>
+          <a:bodyPr rtlCol="0" anchor="ctr"/>
+          <a:lstStyle/>
+          <a:p>
+            <a:endParaRPr lang="en-US">
+              <a:solidFill>
+                <a:srgbClr val="000000"/>
+              </a:solidFill>
+            </a:endParaRPr>
+          </a:p>
+        </p:txBody>
+      </p:sp>
+      <p:sp>
+        <p:nvSpPr>
+          <p:cNvPr id="80" name="Rectangle 79">
+            <a:extLst>
+              <a:ext uri="{FF2B5EF4-FFF2-40B4-BE49-F238E27FC236}">
+                <a16:creationId xmlns:a16="http://schemas.microsoft.com/office/drawing/2014/main" id="{1EB438D2-118B-4AC7-8396-17EF60C6CA43}"/>
+              </a:ext>
+            </a:extLst>
+          </p:cNvPr>
+          <p:cNvSpPr/>
+          <p:nvPr/>
+        </p:nvSpPr>
+        <p:spPr>
+          <a:xfrm>
+            <a:off x="76200" y="3048000"/>
+            <a:ext cx="1143000" cy="685800"/>
+          </a:xfrm>
+          <a:prstGeom prst="rect">
+            <a:avLst/>
+          </a:prstGeom>
+          <a:solidFill>
+            <a:srgbClr val="B0C6E1"/>
+          </a:solidFill>
+          <a:ln w="12700">
+            <a:noFill/>
+          </a:ln>
+        </p:spPr>
+        <p:style>
+          <a:lnRef idx="2">
+            <a:schemeClr val="accent1">
+              <a:shade val="50000"/>
+            </a:schemeClr>
+          </a:lnRef>
+          <a:fillRef idx="1">
+            <a:schemeClr val="accent1"/>
+          </a:fillRef>
+          <a:effectRef idx="0">
+            <a:schemeClr val="accent1"/>
+          </a:effectRef>
+          <a:fontRef idx="minor">
+            <a:schemeClr val="lt1"/>
+          </a:fontRef>
+        </p:style>
+        <p:txBody>
+          <a:bodyPr rtlCol="0" anchor="ctr"/>
+          <a:lstStyle/>
+          <a:p>
+            <a:r>
+              <a:rPr lang="en-US" dirty="0">
+                <a:solidFill>
+                  <a:srgbClr val="000000"/>
+                </a:solidFill>
+              </a:rPr>
+              <a:t>Data</a:t>
+            </a:r>
+            <a:br>
+              <a:rPr lang="en-US" dirty="0">
+                <a:solidFill>
+                  <a:srgbClr val="000000"/>
+                </a:solidFill>
+              </a:rPr>
+            </a:br>
+            <a:r>
+              <a:rPr lang="en-US" dirty="0">
+                <a:solidFill>
+                  <a:srgbClr val="000000"/>
+                </a:solidFill>
+              </a:rPr>
+              <a:t>Standards</a:t>
+            </a:r>
+          </a:p>
+        </p:txBody>
+      </p:sp>
+      <p:sp>
+        <p:nvSpPr>
+          <p:cNvPr id="64" name="Rectangle 63">
+            <a:extLst>
+              <a:ext uri="{FF2B5EF4-FFF2-40B4-BE49-F238E27FC236}">
+                <a16:creationId xmlns:a16="http://schemas.microsoft.com/office/drawing/2014/main" id="{7A9FA661-12AD-47BA-95C7-6CA9D6C2B43D}"/>
+              </a:ext>
+            </a:extLst>
+          </p:cNvPr>
+          <p:cNvSpPr/>
+          <p:nvPr/>
+        </p:nvSpPr>
+        <p:spPr>
+          <a:xfrm>
+            <a:off x="533400" y="1866900"/>
+            <a:ext cx="2019300" cy="304800"/>
+          </a:xfrm>
+          <a:prstGeom prst="rect">
+            <a:avLst/>
+          </a:prstGeom>
+          <a:solidFill>
+            <a:srgbClr val="B0C6E1"/>
+          </a:solidFill>
+          <a:ln w="12700">
+            <a:noFill/>
+          </a:ln>
+        </p:spPr>
+        <p:style>
+          <a:lnRef idx="2">
+            <a:schemeClr val="accent1">
+              <a:shade val="50000"/>
+            </a:schemeClr>
+          </a:lnRef>
+          <a:fillRef idx="1">
+            <a:schemeClr val="accent1"/>
+          </a:fillRef>
+          <a:effectRef idx="0">
+            <a:schemeClr val="accent1"/>
+          </a:effectRef>
+          <a:fontRef idx="minor">
+            <a:schemeClr val="lt1"/>
+          </a:fontRef>
+        </p:style>
+        <p:txBody>
+          <a:bodyPr rtlCol="0" anchor="ctr"/>
+          <a:lstStyle/>
+          <a:p>
+            <a:r>
+              <a:rPr lang="en-US" dirty="0">
+                <a:solidFill>
+                  <a:srgbClr val="000000"/>
+                </a:solidFill>
+              </a:rPr>
+              <a:t>Organizational Data</a:t>
+            </a:r>
+          </a:p>
+        </p:txBody>
+      </p:sp>
+      <p:sp>
+        <p:nvSpPr>
+          <p:cNvPr id="76" name="Rectangle 75">
+            <a:extLst>
+              <a:ext uri="{FF2B5EF4-FFF2-40B4-BE49-F238E27FC236}">
+                <a16:creationId xmlns:a16="http://schemas.microsoft.com/office/drawing/2014/main" id="{43EF6C0C-AB74-462D-BC92-578F345D5EB7}"/>
+              </a:ext>
+            </a:extLst>
+          </p:cNvPr>
+          <p:cNvSpPr/>
+          <p:nvPr/>
+        </p:nvSpPr>
+        <p:spPr>
+          <a:xfrm>
+            <a:off x="533400" y="3924300"/>
+            <a:ext cx="2019300" cy="304800"/>
+          </a:xfrm>
+          <a:prstGeom prst="rect">
+            <a:avLst/>
+          </a:prstGeom>
+          <a:solidFill>
+            <a:srgbClr val="B0C6E1"/>
+          </a:solidFill>
+          <a:ln w="12700">
+            <a:noFill/>
+          </a:ln>
+        </p:spPr>
+        <p:style>
+          <a:lnRef idx="2">
+            <a:schemeClr val="accent1">
+              <a:shade val="50000"/>
+            </a:schemeClr>
+          </a:lnRef>
+          <a:fillRef idx="1">
+            <a:schemeClr val="accent1"/>
+          </a:fillRef>
+          <a:effectRef idx="0">
+            <a:schemeClr val="accent1"/>
+          </a:effectRef>
+          <a:fontRef idx="minor">
+            <a:schemeClr val="lt1"/>
+          </a:fontRef>
+        </p:style>
+        <p:txBody>
+          <a:bodyPr rtlCol="0" anchor="ctr"/>
+          <a:lstStyle/>
+          <a:p>
+            <a:r>
+              <a:rPr lang="en-US" dirty="0">
+                <a:solidFill>
+                  <a:srgbClr val="000000"/>
+                </a:solidFill>
+              </a:rPr>
+              <a:t>Pedagogical Data</a:t>
+            </a:r>
+          </a:p>
+        </p:txBody>
+      </p:sp>
+      <p:sp>
+        <p:nvSpPr>
+          <p:cNvPr id="52" name="Rectangle 51">
+            <a:extLst>
+              <a:ext uri="{FF2B5EF4-FFF2-40B4-BE49-F238E27FC236}">
+                <a16:creationId xmlns:a16="http://schemas.microsoft.com/office/drawing/2014/main" id="{B1123211-0A47-43F4-B5D5-3C9F0EF3D0E2}"/>
+              </a:ext>
+            </a:extLst>
+          </p:cNvPr>
+          <p:cNvSpPr/>
+          <p:nvPr/>
+        </p:nvSpPr>
+        <p:spPr>
+          <a:xfrm>
+            <a:off x="533400" y="5638800"/>
+            <a:ext cx="8305800" cy="304800"/>
+          </a:xfrm>
+          <a:prstGeom prst="rect">
+            <a:avLst/>
+          </a:prstGeom>
+          <a:solidFill>
+            <a:srgbClr val="B0C6E1"/>
+          </a:solidFill>
+          <a:ln w="12700">
+            <a:noFill/>
+          </a:ln>
+        </p:spPr>
+        <p:style>
+          <a:lnRef idx="2">
+            <a:schemeClr val="accent1">
+              <a:shade val="50000"/>
+            </a:schemeClr>
+          </a:lnRef>
+          <a:fillRef idx="1">
+            <a:schemeClr val="accent1"/>
+          </a:fillRef>
+          <a:effectRef idx="0">
+            <a:schemeClr val="accent1"/>
+          </a:effectRef>
+          <a:fontRef idx="minor">
+            <a:schemeClr val="lt1"/>
+          </a:fontRef>
+        </p:style>
+        <p:txBody>
+          <a:bodyPr rtlCol="0" anchor="ctr"/>
+          <a:lstStyle/>
+          <a:p>
+            <a:r>
+              <a:rPr lang="en-US" dirty="0">
+                <a:solidFill>
+                  <a:srgbClr val="000000"/>
+                </a:solidFill>
+              </a:rPr>
+              <a:t>Foundational Standards</a:t>
+            </a:r>
+          </a:p>
+        </p:txBody>
+      </p:sp>
+      <p:sp>
+        <p:nvSpPr>
+          <p:cNvPr id="5" name="Rectangle 4">
+            <a:extLst>
+              <a:ext uri="{FF2B5EF4-FFF2-40B4-BE49-F238E27FC236}">
+                <a16:creationId xmlns:a16="http://schemas.microsoft.com/office/drawing/2014/main" id="{C6706F1E-6D81-4DF0-9BC7-A7D48695D99C}"/>
+              </a:ext>
+            </a:extLst>
+          </p:cNvPr>
+          <p:cNvSpPr/>
+          <p:nvPr/>
+        </p:nvSpPr>
+        <p:spPr>
+          <a:xfrm>
+            <a:off x="1295400" y="1524000"/>
+            <a:ext cx="7543800" cy="304800"/>
+          </a:xfrm>
+          <a:prstGeom prst="rect">
+            <a:avLst/>
+          </a:prstGeom>
+          <a:solidFill>
+            <a:srgbClr val="B0C6E1"/>
+          </a:solidFill>
+          <a:ln w="12700">
+            <a:noFill/>
+          </a:ln>
+        </p:spPr>
+        <p:style>
+          <a:lnRef idx="2">
+            <a:schemeClr val="accent1">
+              <a:shade val="50000"/>
+            </a:schemeClr>
+          </a:lnRef>
+          <a:fillRef idx="1">
+            <a:schemeClr val="accent1"/>
+          </a:fillRef>
+          <a:effectRef idx="0">
+            <a:schemeClr val="accent1"/>
+          </a:effectRef>
+          <a:fontRef idx="minor">
+            <a:schemeClr val="lt1"/>
+          </a:fontRef>
+        </p:style>
+        <p:txBody>
+          <a:bodyPr rtlCol="0" anchor="ctr"/>
+          <a:lstStyle/>
+          <a:p>
+            <a:r>
+              <a:rPr lang="en-US" dirty="0">
+                <a:solidFill>
+                  <a:srgbClr val="000000"/>
+                </a:solidFill>
+              </a:rPr>
+              <a:t>Student Data</a:t>
+            </a:r>
+          </a:p>
+        </p:txBody>
+      </p:sp>
+      <p:sp>
+        <p:nvSpPr>
+          <p:cNvPr id="47" name="Rectangle 46">
+            <a:extLst>
+              <a:ext uri="{FF2B5EF4-FFF2-40B4-BE49-F238E27FC236}">
+                <a16:creationId xmlns:a16="http://schemas.microsoft.com/office/drawing/2014/main" id="{D13E14B6-C5F9-4921-B47A-A713D13FD3B7}"/>
+              </a:ext>
+            </a:extLst>
+          </p:cNvPr>
+          <p:cNvSpPr/>
+          <p:nvPr/>
+        </p:nvSpPr>
+        <p:spPr>
+          <a:xfrm>
+            <a:off x="1295400" y="2209800"/>
+            <a:ext cx="7543800" cy="304800"/>
+          </a:xfrm>
+          <a:prstGeom prst="rect">
+            <a:avLst/>
+          </a:prstGeom>
+          <a:solidFill>
+            <a:srgbClr val="B0C6E1"/>
+          </a:solidFill>
+          <a:ln w="12700">
+            <a:noFill/>
+          </a:ln>
+        </p:spPr>
+        <p:style>
+          <a:lnRef idx="2">
+            <a:schemeClr val="accent1">
+              <a:shade val="50000"/>
+            </a:schemeClr>
+          </a:lnRef>
+          <a:fillRef idx="1">
+            <a:schemeClr val="accent1"/>
+          </a:fillRef>
+          <a:effectRef idx="0">
+            <a:schemeClr val="accent1"/>
+          </a:effectRef>
+          <a:fontRef idx="minor">
+            <a:schemeClr val="lt1"/>
+          </a:fontRef>
+        </p:style>
+        <p:txBody>
+          <a:bodyPr rtlCol="0" anchor="ctr"/>
+          <a:lstStyle/>
+          <a:p>
+            <a:r>
+              <a:rPr lang="en-US" dirty="0">
+                <a:solidFill>
+                  <a:srgbClr val="000000"/>
+                </a:solidFill>
+              </a:rPr>
+              <a:t>Educator Data</a:t>
+            </a:r>
+          </a:p>
+        </p:txBody>
+      </p:sp>
+      <p:sp>
+        <p:nvSpPr>
+          <p:cNvPr id="48" name="Rectangle 47">
+            <a:extLst>
+              <a:ext uri="{FF2B5EF4-FFF2-40B4-BE49-F238E27FC236}">
+                <a16:creationId xmlns:a16="http://schemas.microsoft.com/office/drawing/2014/main" id="{1E322921-DE60-4BFF-8CC0-986B6AC17011}"/>
+              </a:ext>
+            </a:extLst>
+          </p:cNvPr>
+          <p:cNvSpPr/>
+          <p:nvPr/>
+        </p:nvSpPr>
+        <p:spPr>
+          <a:xfrm>
+            <a:off x="1295400" y="2895600"/>
+            <a:ext cx="7543800" cy="304800"/>
+          </a:xfrm>
+          <a:prstGeom prst="rect">
+            <a:avLst/>
+          </a:prstGeom>
+          <a:solidFill>
+            <a:srgbClr val="B0C6E1"/>
+          </a:solidFill>
+          <a:ln w="12700">
+            <a:noFill/>
+          </a:ln>
+        </p:spPr>
+        <p:style>
+          <a:lnRef idx="2">
+            <a:schemeClr val="accent1">
+              <a:shade val="50000"/>
+            </a:schemeClr>
+          </a:lnRef>
+          <a:fillRef idx="1">
+            <a:schemeClr val="accent1"/>
+          </a:fillRef>
+          <a:effectRef idx="0">
+            <a:schemeClr val="accent1"/>
+          </a:effectRef>
+          <a:fontRef idx="minor">
+            <a:schemeClr val="lt1"/>
+          </a:fontRef>
+        </p:style>
+        <p:txBody>
+          <a:bodyPr rtlCol="0" anchor="ctr"/>
+          <a:lstStyle/>
+          <a:p>
+            <a:r>
+              <a:rPr lang="en-US" dirty="0">
+                <a:solidFill>
+                  <a:srgbClr val="000000"/>
+                </a:solidFill>
+              </a:rPr>
+              <a:t>Institutional Data</a:t>
+            </a:r>
+          </a:p>
+        </p:txBody>
+      </p:sp>
+      <p:sp>
+        <p:nvSpPr>
+          <p:cNvPr id="49" name="Rectangle 48">
+            <a:extLst>
+              <a:ext uri="{FF2B5EF4-FFF2-40B4-BE49-F238E27FC236}">
+                <a16:creationId xmlns:a16="http://schemas.microsoft.com/office/drawing/2014/main" id="{023F9A62-05F9-40BE-AA6B-1C5957F11095}"/>
+              </a:ext>
+            </a:extLst>
+          </p:cNvPr>
+          <p:cNvSpPr/>
+          <p:nvPr/>
+        </p:nvSpPr>
+        <p:spPr>
+          <a:xfrm>
+            <a:off x="1295400" y="3581400"/>
+            <a:ext cx="7543800" cy="304800"/>
+          </a:xfrm>
+          <a:prstGeom prst="rect">
+            <a:avLst/>
+          </a:prstGeom>
+          <a:solidFill>
+            <a:srgbClr val="B0C6E1"/>
+          </a:solidFill>
+          <a:ln w="12700">
+            <a:noFill/>
+          </a:ln>
+        </p:spPr>
+        <p:style>
+          <a:lnRef idx="2">
+            <a:schemeClr val="accent1">
+              <a:shade val="50000"/>
+            </a:schemeClr>
+          </a:lnRef>
+          <a:fillRef idx="1">
+            <a:schemeClr val="accent1"/>
+          </a:fillRef>
+          <a:effectRef idx="0">
+            <a:schemeClr val="accent1"/>
+          </a:effectRef>
+          <a:fontRef idx="minor">
+            <a:schemeClr val="lt1"/>
+          </a:fontRef>
+        </p:style>
+        <p:txBody>
+          <a:bodyPr rtlCol="0" anchor="ctr"/>
+          <a:lstStyle/>
+          <a:p>
+            <a:r>
+              <a:rPr lang="en-US" dirty="0">
+                <a:solidFill>
+                  <a:srgbClr val="000000"/>
+                </a:solidFill>
+              </a:rPr>
+              <a:t>Competency Data Model</a:t>
+            </a:r>
+          </a:p>
+        </p:txBody>
+      </p:sp>
+      <p:sp>
+        <p:nvSpPr>
+          <p:cNvPr id="50" name="Rectangle 49">
+            <a:extLst>
+              <a:ext uri="{FF2B5EF4-FFF2-40B4-BE49-F238E27FC236}">
+                <a16:creationId xmlns:a16="http://schemas.microsoft.com/office/drawing/2014/main" id="{52A7FFFF-E53C-403B-B0ED-69F1EC5063D2}"/>
+              </a:ext>
+            </a:extLst>
+          </p:cNvPr>
+          <p:cNvSpPr/>
+          <p:nvPr/>
+        </p:nvSpPr>
+        <p:spPr>
+          <a:xfrm>
+            <a:off x="1295400" y="4267200"/>
+            <a:ext cx="7543800" cy="304800"/>
+          </a:xfrm>
+          <a:prstGeom prst="rect">
+            <a:avLst/>
+          </a:prstGeom>
+          <a:solidFill>
+            <a:srgbClr val="B0C6E1"/>
+          </a:solidFill>
+          <a:ln w="12700">
+            <a:noFill/>
+          </a:ln>
+        </p:spPr>
+        <p:style>
+          <a:lnRef idx="2">
+            <a:schemeClr val="accent1">
+              <a:shade val="50000"/>
+            </a:schemeClr>
+          </a:lnRef>
+          <a:fillRef idx="1">
+            <a:schemeClr val="accent1"/>
+          </a:fillRef>
+          <a:effectRef idx="0">
+            <a:schemeClr val="accent1"/>
+          </a:effectRef>
+          <a:fontRef idx="minor">
+            <a:schemeClr val="lt1"/>
+          </a:fontRef>
+        </p:style>
+        <p:txBody>
+          <a:bodyPr rtlCol="0" anchor="ctr"/>
+          <a:lstStyle/>
+          <a:p>
+            <a:r>
+              <a:rPr lang="en-US" dirty="0">
+                <a:solidFill>
+                  <a:srgbClr val="000000"/>
+                </a:solidFill>
+              </a:rPr>
+              <a:t>Content Metadata</a:t>
+            </a:r>
+          </a:p>
+        </p:txBody>
+      </p:sp>
+      <p:sp>
+        <p:nvSpPr>
+          <p:cNvPr id="51" name="Rectangle 50">
+            <a:extLst>
+              <a:ext uri="{FF2B5EF4-FFF2-40B4-BE49-F238E27FC236}">
+                <a16:creationId xmlns:a16="http://schemas.microsoft.com/office/drawing/2014/main" id="{3BC8B312-6F15-4C38-8B7E-F2588749B397}"/>
+              </a:ext>
+            </a:extLst>
+          </p:cNvPr>
+          <p:cNvSpPr/>
+          <p:nvPr/>
+        </p:nvSpPr>
+        <p:spPr>
+          <a:xfrm>
+            <a:off x="1295400" y="4953000"/>
+            <a:ext cx="7543800" cy="304800"/>
+          </a:xfrm>
+          <a:prstGeom prst="rect">
+            <a:avLst/>
+          </a:prstGeom>
+          <a:solidFill>
+            <a:srgbClr val="B0C6E1"/>
+          </a:solidFill>
+          <a:ln w="12700">
+            <a:noFill/>
+          </a:ln>
+        </p:spPr>
+        <p:style>
+          <a:lnRef idx="2">
+            <a:schemeClr val="accent1">
+              <a:shade val="50000"/>
+            </a:schemeClr>
+          </a:lnRef>
+          <a:fillRef idx="1">
+            <a:schemeClr val="accent1"/>
+          </a:fillRef>
+          <a:effectRef idx="0">
+            <a:schemeClr val="accent1"/>
+          </a:effectRef>
+          <a:fontRef idx="minor">
+            <a:schemeClr val="lt1"/>
+          </a:fontRef>
+        </p:style>
+        <p:txBody>
+          <a:bodyPr rtlCol="0" anchor="ctr"/>
+          <a:lstStyle/>
+          <a:p>
+            <a:r>
+              <a:rPr lang="en-US" dirty="0">
+                <a:solidFill>
+                  <a:srgbClr val="000000"/>
+                </a:solidFill>
+              </a:rPr>
+              <a:t>Content Packaging &amp; Integration</a:t>
+            </a:r>
+          </a:p>
+        </p:txBody>
+      </p:sp>
+      <p:sp>
+        <p:nvSpPr>
+          <p:cNvPr id="2" name="Rectangle 1"/>
+          <p:cNvSpPr/>
+          <p:nvPr/>
+        </p:nvSpPr>
+        <p:spPr>
+          <a:xfrm>
+            <a:off x="4495800" y="73460"/>
+            <a:ext cx="762000" cy="5946340"/>
+          </a:xfrm>
+          <a:prstGeom prst="rect">
+            <a:avLst/>
+          </a:prstGeom>
+          <a:solidFill>
+            <a:srgbClr val="C0504D">
+              <a:alpha val="40000"/>
+            </a:srgbClr>
+          </a:solidFill>
+          <a:ln>
+            <a:noFill/>
+          </a:ln>
+        </p:spPr>
+        <p:style>
+          <a:lnRef idx="2">
+            <a:schemeClr val="accent1">
+              <a:shade val="50000"/>
+            </a:schemeClr>
+          </a:lnRef>
+          <a:fillRef idx="1">
+            <a:schemeClr val="accent1"/>
+          </a:fillRef>
+          <a:effectRef idx="0">
+            <a:schemeClr val="accent1"/>
+          </a:effectRef>
+          <a:fontRef idx="minor">
+            <a:schemeClr val="lt1"/>
+          </a:fontRef>
+        </p:style>
+        <p:txBody>
+          <a:bodyPr vert="vert" rtlCol="0" anchor="ctr"/>
+          <a:lstStyle/>
+          <a:p>
+            <a:r>
+              <a:rPr lang="en-US" dirty="0">
+                <a:solidFill>
+                  <a:schemeClr val="tx1"/>
+                </a:solidFill>
+              </a:rPr>
+              <a:t>1. Data</a:t>
+            </a:r>
+            <a:br>
+              <a:rPr lang="en-US" dirty="0">
+                <a:solidFill>
+                  <a:schemeClr val="tx1"/>
+                </a:solidFill>
+              </a:rPr>
+            </a:br>
+            <a:r>
+              <a:rPr lang="en-US" dirty="0">
+                <a:solidFill>
+                  <a:schemeClr val="tx1"/>
+                </a:solidFill>
+              </a:rPr>
+              <a:t>Dictionary</a:t>
+            </a:r>
+          </a:p>
+        </p:txBody>
+      </p:sp>
+      <p:sp>
+        <p:nvSpPr>
+          <p:cNvPr id="54" name="Rectangle 53"/>
+          <p:cNvSpPr/>
+          <p:nvPr/>
+        </p:nvSpPr>
+        <p:spPr>
+          <a:xfrm>
+            <a:off x="5638800" y="73460"/>
+            <a:ext cx="762000" cy="5946340"/>
+          </a:xfrm>
+          <a:prstGeom prst="rect">
+            <a:avLst/>
+          </a:prstGeom>
+          <a:solidFill>
+            <a:srgbClr val="C0504D">
+              <a:alpha val="40000"/>
+            </a:srgbClr>
+          </a:solidFill>
+          <a:ln>
+            <a:noFill/>
+          </a:ln>
+        </p:spPr>
+        <p:style>
+          <a:lnRef idx="2">
+            <a:schemeClr val="accent1">
+              <a:shade val="50000"/>
+            </a:schemeClr>
+          </a:lnRef>
+          <a:fillRef idx="1">
+            <a:schemeClr val="accent1"/>
+          </a:fillRef>
+          <a:effectRef idx="0">
+            <a:schemeClr val="accent1"/>
+          </a:effectRef>
+          <a:fontRef idx="minor">
+            <a:schemeClr val="lt1"/>
+          </a:fontRef>
+        </p:style>
+        <p:txBody>
+          <a:bodyPr vert="vert" rtlCol="0" anchor="ctr"/>
+          <a:lstStyle/>
+          <a:p>
+            <a:r>
+              <a:rPr lang="en-US" dirty="0">
+                <a:solidFill>
+                  <a:schemeClr val="tx1"/>
+                </a:solidFill>
+              </a:rPr>
+              <a:t>2. Logical</a:t>
+            </a:r>
+            <a:br>
+              <a:rPr lang="en-US" dirty="0">
+                <a:solidFill>
+                  <a:schemeClr val="tx1"/>
+                </a:solidFill>
+              </a:rPr>
+            </a:br>
+            <a:r>
+              <a:rPr lang="en-US" dirty="0">
+                <a:solidFill>
+                  <a:schemeClr val="tx1"/>
+                </a:solidFill>
+              </a:rPr>
+              <a:t>Data Model</a:t>
+            </a:r>
+          </a:p>
+        </p:txBody>
+      </p:sp>
+      <p:sp>
+        <p:nvSpPr>
+          <p:cNvPr id="56" name="Rectangle 55"/>
+          <p:cNvSpPr/>
+          <p:nvPr/>
+        </p:nvSpPr>
+        <p:spPr>
+          <a:xfrm>
+            <a:off x="7924800" y="73460"/>
+            <a:ext cx="761999" cy="5946340"/>
+          </a:xfrm>
+          <a:prstGeom prst="rect">
+            <a:avLst/>
+          </a:prstGeom>
+          <a:solidFill>
+            <a:srgbClr val="C0504D">
+              <a:alpha val="40000"/>
+            </a:srgbClr>
+          </a:solidFill>
+          <a:ln>
+            <a:noFill/>
+          </a:ln>
+        </p:spPr>
+        <p:style>
+          <a:lnRef idx="2">
+            <a:schemeClr val="accent1">
+              <a:shade val="50000"/>
+            </a:schemeClr>
+          </a:lnRef>
+          <a:fillRef idx="1">
+            <a:schemeClr val="accent1"/>
+          </a:fillRef>
+          <a:effectRef idx="0">
+            <a:schemeClr val="accent1"/>
+          </a:effectRef>
+          <a:fontRef idx="minor">
+            <a:schemeClr val="lt1"/>
+          </a:fontRef>
+        </p:style>
+        <p:txBody>
+          <a:bodyPr vert="vert" rtlCol="0" anchor="ctr"/>
+          <a:lstStyle/>
+          <a:p>
+            <a:r>
+              <a:rPr lang="en-US" dirty="0">
+                <a:solidFill>
+                  <a:schemeClr val="tx1"/>
+                </a:solidFill>
+              </a:rPr>
+              <a:t>4. Protocol</a:t>
+            </a:r>
+          </a:p>
+        </p:txBody>
+      </p:sp>
+      <p:sp>
+        <p:nvSpPr>
+          <p:cNvPr id="58" name="Rectangle 57"/>
+          <p:cNvSpPr/>
+          <p:nvPr/>
+        </p:nvSpPr>
+        <p:spPr>
+          <a:xfrm>
+            <a:off x="6781800" y="73460"/>
+            <a:ext cx="761999" cy="5946340"/>
+          </a:xfrm>
+          <a:prstGeom prst="rect">
+            <a:avLst/>
+          </a:prstGeom>
+          <a:solidFill>
+            <a:srgbClr val="C0504D">
+              <a:alpha val="40000"/>
+            </a:srgbClr>
+          </a:solidFill>
+          <a:ln>
+            <a:noFill/>
+          </a:ln>
+        </p:spPr>
+        <p:style>
+          <a:lnRef idx="2">
+            <a:schemeClr val="accent1">
+              <a:shade val="50000"/>
+            </a:schemeClr>
+          </a:lnRef>
+          <a:fillRef idx="1">
+            <a:schemeClr val="accent1"/>
+          </a:fillRef>
+          <a:effectRef idx="0">
+            <a:schemeClr val="accent1"/>
+          </a:effectRef>
+          <a:fontRef idx="minor">
+            <a:schemeClr val="lt1"/>
+          </a:fontRef>
+        </p:style>
+        <p:txBody>
+          <a:bodyPr vert="vert" rtlCol="0" anchor="ctr"/>
+          <a:lstStyle/>
+          <a:p>
+            <a:r>
+              <a:rPr lang="en-US" dirty="0">
+                <a:solidFill>
+                  <a:schemeClr val="tx1"/>
+                </a:solidFill>
+              </a:rPr>
+              <a:t>3. Serialization</a:t>
+            </a:r>
+          </a:p>
+        </p:txBody>
+      </p:sp>
+      <p:sp>
+        <p:nvSpPr>
+          <p:cNvPr id="21" name="Rounded Rectangle 20"/>
+          <p:cNvSpPr/>
+          <p:nvPr/>
+        </p:nvSpPr>
+        <p:spPr>
+          <a:xfrm>
+            <a:off x="1600200" y="6172200"/>
+            <a:ext cx="642201" cy="232048"/>
+          </a:xfrm>
+          <a:prstGeom prst="roundRect">
+            <a:avLst/>
+          </a:prstGeom>
+          <a:noFill/>
+          <a:ln w="12700">
+            <a:solidFill>
+              <a:schemeClr val="tx1"/>
+            </a:solidFill>
+          </a:ln>
+        </p:spPr>
+        <p:style>
+          <a:lnRef idx="2">
+            <a:schemeClr val="accent1">
+              <a:shade val="50000"/>
+            </a:schemeClr>
+          </a:lnRef>
+          <a:fillRef idx="1">
+            <a:schemeClr val="accent1"/>
+          </a:fillRef>
+          <a:effectRef idx="0">
+            <a:schemeClr val="accent1"/>
+          </a:effectRef>
+          <a:fontRef idx="minor">
+            <a:schemeClr val="lt1"/>
+          </a:fontRef>
+        </p:style>
+        <p:txBody>
+          <a:bodyPr wrap="square" lIns="45720" tIns="0" rIns="9144" bIns="0" rtlCol="0" anchor="t" anchorCtr="0"/>
+          <a:lstStyle/>
+          <a:p>
+            <a:r>
+              <a:rPr lang="en-US" sz="1400" dirty="0">
+                <a:solidFill>
+                  <a:schemeClr val="tx1"/>
+                </a:solidFill>
+              </a:rPr>
+              <a:t>CCSS</a:t>
+            </a:r>
+          </a:p>
+        </p:txBody>
+      </p:sp>
+      <p:sp>
+        <p:nvSpPr>
+          <p:cNvPr id="81" name="Rounded Rectangle 20">
+            <a:extLst>
+              <a:ext uri="{FF2B5EF4-FFF2-40B4-BE49-F238E27FC236}">
+                <a16:creationId xmlns:a16="http://schemas.microsoft.com/office/drawing/2014/main" id="{D50CF968-2FAD-4144-8F07-C68F70941B2B}"/>
+              </a:ext>
+            </a:extLst>
+          </p:cNvPr>
+          <p:cNvSpPr/>
+          <p:nvPr/>
+        </p:nvSpPr>
+        <p:spPr>
+          <a:xfrm>
+            <a:off x="1785201" y="6477000"/>
+            <a:ext cx="642201" cy="232048"/>
+          </a:xfrm>
+          <a:prstGeom prst="roundRect">
+            <a:avLst/>
+          </a:prstGeom>
+          <a:noFill/>
+          <a:ln w="12700">
+            <a:solidFill>
+              <a:schemeClr val="tx1"/>
+            </a:solidFill>
+          </a:ln>
+        </p:spPr>
+        <p:style>
+          <a:lnRef idx="2">
+            <a:schemeClr val="accent1">
+              <a:shade val="50000"/>
+            </a:schemeClr>
+          </a:lnRef>
+          <a:fillRef idx="1">
+            <a:schemeClr val="accent1"/>
+          </a:fillRef>
+          <a:effectRef idx="0">
+            <a:schemeClr val="accent1"/>
+          </a:effectRef>
+          <a:fontRef idx="minor">
+            <a:schemeClr val="lt1"/>
+          </a:fontRef>
+        </p:style>
+        <p:txBody>
+          <a:bodyPr wrap="square" lIns="45720" tIns="0" rIns="9144" bIns="0" rtlCol="0" anchor="t" anchorCtr="0"/>
+          <a:lstStyle/>
+          <a:p>
+            <a:r>
+              <a:rPr lang="en-US" sz="1400" dirty="0">
+                <a:solidFill>
+                  <a:schemeClr val="tx1"/>
+                </a:solidFill>
+              </a:rPr>
+              <a:t>NGSS</a:t>
+            </a:r>
+          </a:p>
+        </p:txBody>
+      </p:sp>
+      <p:sp>
+        <p:nvSpPr>
+          <p:cNvPr id="82" name="Rounded Rectangle 20">
+            <a:extLst>
+              <a:ext uri="{FF2B5EF4-FFF2-40B4-BE49-F238E27FC236}">
+                <a16:creationId xmlns:a16="http://schemas.microsoft.com/office/drawing/2014/main" id="{D45FDD56-4A78-43B8-91A7-D51027CC72C7}"/>
+              </a:ext>
+            </a:extLst>
+          </p:cNvPr>
+          <p:cNvSpPr/>
+          <p:nvPr/>
+        </p:nvSpPr>
+        <p:spPr>
+          <a:xfrm>
+            <a:off x="2362200" y="6019800"/>
+            <a:ext cx="1219200" cy="232048"/>
+          </a:xfrm>
+          <a:prstGeom prst="roundRect">
+            <a:avLst/>
+          </a:prstGeom>
+          <a:noFill/>
+          <a:ln w="12700">
+            <a:solidFill>
+              <a:schemeClr val="tx1"/>
+            </a:solidFill>
+          </a:ln>
+        </p:spPr>
+        <p:style>
+          <a:lnRef idx="2">
+            <a:schemeClr val="accent1">
+              <a:shade val="50000"/>
+            </a:schemeClr>
+          </a:lnRef>
+          <a:fillRef idx="1">
+            <a:schemeClr val="accent1"/>
+          </a:fillRef>
+          <a:effectRef idx="0">
+            <a:schemeClr val="accent1"/>
+          </a:effectRef>
+          <a:fontRef idx="minor">
+            <a:schemeClr val="lt1"/>
+          </a:fontRef>
+        </p:style>
+        <p:txBody>
+          <a:bodyPr wrap="square" lIns="45720" tIns="0" rIns="9144" bIns="0" rtlCol="0" anchor="t" anchorCtr="0"/>
+          <a:lstStyle/>
+          <a:p>
+            <a:r>
+              <a:rPr lang="en-US" sz="1400" dirty="0">
+                <a:solidFill>
+                  <a:schemeClr val="tx1"/>
+                </a:solidFill>
+              </a:rPr>
+              <a:t>ISTE Standards</a:t>
+            </a:r>
+          </a:p>
+        </p:txBody>
+      </p:sp>
+      <p:sp>
+        <p:nvSpPr>
+          <p:cNvPr id="83" name="Rounded Rectangle 20">
+            <a:extLst>
+              <a:ext uri="{FF2B5EF4-FFF2-40B4-BE49-F238E27FC236}">
+                <a16:creationId xmlns:a16="http://schemas.microsoft.com/office/drawing/2014/main" id="{F0C8521D-96D3-4099-AE0D-3CE5A2E56452}"/>
+              </a:ext>
+            </a:extLst>
+          </p:cNvPr>
+          <p:cNvSpPr/>
+          <p:nvPr/>
+        </p:nvSpPr>
+        <p:spPr>
+          <a:xfrm>
+            <a:off x="2514600" y="6324600"/>
+            <a:ext cx="914400" cy="457200"/>
+          </a:xfrm>
+          <a:prstGeom prst="roundRect">
+            <a:avLst/>
+          </a:prstGeom>
+          <a:noFill/>
+          <a:ln w="12700">
+            <a:solidFill>
+              <a:schemeClr val="tx1"/>
+            </a:solidFill>
+          </a:ln>
+        </p:spPr>
+        <p:style>
+          <a:lnRef idx="2">
+            <a:schemeClr val="accent1">
+              <a:shade val="50000"/>
+            </a:schemeClr>
+          </a:lnRef>
+          <a:fillRef idx="1">
+            <a:schemeClr val="accent1"/>
+          </a:fillRef>
+          <a:effectRef idx="0">
+            <a:schemeClr val="accent1"/>
+          </a:effectRef>
+          <a:fontRef idx="minor">
+            <a:schemeClr val="lt1"/>
+          </a:fontRef>
+        </p:style>
+        <p:txBody>
+          <a:bodyPr wrap="square" lIns="45720" tIns="0" rIns="9144" bIns="0" rtlCol="0" anchor="t" anchorCtr="0"/>
+          <a:lstStyle/>
+          <a:p>
+            <a:r>
+              <a:rPr lang="en-US" sz="1400" dirty="0">
+                <a:solidFill>
+                  <a:schemeClr val="tx1"/>
+                </a:solidFill>
+              </a:rPr>
+              <a:t>State Standards</a:t>
+            </a:r>
+          </a:p>
+        </p:txBody>
+      </p:sp>
+      <p:sp>
+        <p:nvSpPr>
+          <p:cNvPr id="84" name="Rounded Rectangle 20">
+            <a:extLst>
+              <a:ext uri="{FF2B5EF4-FFF2-40B4-BE49-F238E27FC236}">
+                <a16:creationId xmlns:a16="http://schemas.microsoft.com/office/drawing/2014/main" id="{821E1A87-90DC-4BBA-9F59-A3297E834E13}"/>
+              </a:ext>
+            </a:extLst>
+          </p:cNvPr>
+          <p:cNvSpPr/>
+          <p:nvPr/>
+        </p:nvSpPr>
+        <p:spPr>
+          <a:xfrm>
+            <a:off x="3505200" y="6324600"/>
+            <a:ext cx="1143000" cy="457200"/>
+          </a:xfrm>
+          <a:prstGeom prst="roundRect">
+            <a:avLst/>
+          </a:prstGeom>
+          <a:noFill/>
+          <a:ln w="12700">
+            <a:solidFill>
+              <a:schemeClr val="tx1"/>
+            </a:solidFill>
+          </a:ln>
+        </p:spPr>
+        <p:style>
+          <a:lnRef idx="2">
+            <a:schemeClr val="accent1">
+              <a:shade val="50000"/>
+            </a:schemeClr>
+          </a:lnRef>
+          <a:fillRef idx="1">
+            <a:schemeClr val="accent1"/>
+          </a:fillRef>
+          <a:effectRef idx="0">
+            <a:schemeClr val="accent1"/>
+          </a:effectRef>
+          <a:fontRef idx="minor">
+            <a:schemeClr val="lt1"/>
+          </a:fontRef>
+        </p:style>
+        <p:txBody>
+          <a:bodyPr wrap="square" lIns="45720" tIns="0" rIns="9144" bIns="0" rtlCol="0" anchor="t" anchorCtr="0"/>
+          <a:lstStyle/>
+          <a:p>
+            <a:r>
+              <a:rPr lang="en-US" sz="1400" dirty="0">
+                <a:solidFill>
+                  <a:schemeClr val="tx1"/>
+                </a:solidFill>
+              </a:rPr>
+              <a:t>Professional</a:t>
+            </a:r>
+            <a:br>
+              <a:rPr lang="en-US" sz="1400" dirty="0">
+                <a:solidFill>
+                  <a:schemeClr val="tx1"/>
+                </a:solidFill>
+              </a:rPr>
+            </a:br>
+            <a:r>
+              <a:rPr lang="en-US" sz="1400" dirty="0">
+                <a:solidFill>
+                  <a:schemeClr val="tx1"/>
+                </a:solidFill>
+              </a:rPr>
+              <a:t>Certifications</a:t>
+            </a:r>
+          </a:p>
+        </p:txBody>
+      </p:sp>
+      <p:sp>
+        <p:nvSpPr>
+          <p:cNvPr id="85" name="Rounded Rectangle 20">
+            <a:extLst>
+              <a:ext uri="{FF2B5EF4-FFF2-40B4-BE49-F238E27FC236}">
+                <a16:creationId xmlns:a16="http://schemas.microsoft.com/office/drawing/2014/main" id="{A910A5BF-9C14-4376-990F-9333332F5D8C}"/>
+              </a:ext>
+            </a:extLst>
+          </p:cNvPr>
+          <p:cNvSpPr/>
+          <p:nvPr/>
+        </p:nvSpPr>
+        <p:spPr>
+          <a:xfrm>
+            <a:off x="5987199" y="6172200"/>
+            <a:ext cx="489801" cy="232048"/>
+          </a:xfrm>
+          <a:prstGeom prst="roundRect">
+            <a:avLst/>
+          </a:prstGeom>
+          <a:noFill/>
+          <a:ln w="12700">
+            <a:solidFill>
+              <a:schemeClr val="tx1"/>
+            </a:solidFill>
+          </a:ln>
+        </p:spPr>
+        <p:style>
+          <a:lnRef idx="2">
+            <a:schemeClr val="accent1">
+              <a:shade val="50000"/>
+            </a:schemeClr>
+          </a:lnRef>
+          <a:fillRef idx="1">
+            <a:schemeClr val="accent1"/>
+          </a:fillRef>
+          <a:effectRef idx="0">
+            <a:schemeClr val="accent1"/>
+          </a:effectRef>
+          <a:fontRef idx="minor">
+            <a:schemeClr val="lt1"/>
+          </a:fontRef>
+        </p:style>
+        <p:txBody>
+          <a:bodyPr wrap="square" lIns="45720" tIns="0" rIns="9144" bIns="0" rtlCol="0" anchor="t" anchorCtr="0"/>
+          <a:lstStyle/>
+          <a:p>
+            <a:r>
+              <a:rPr lang="en-US" sz="1400" dirty="0">
+                <a:solidFill>
+                  <a:schemeClr val="tx1"/>
+                </a:solidFill>
+              </a:rPr>
+              <a:t>UDL</a:t>
+            </a:r>
+          </a:p>
+        </p:txBody>
+      </p:sp>
+      <p:sp>
+        <p:nvSpPr>
+          <p:cNvPr id="86" name="Rounded Rectangle 20">
+            <a:extLst>
+              <a:ext uri="{FF2B5EF4-FFF2-40B4-BE49-F238E27FC236}">
+                <a16:creationId xmlns:a16="http://schemas.microsoft.com/office/drawing/2014/main" id="{86713479-474B-4697-B12E-FA8425642A7D}"/>
+              </a:ext>
+            </a:extLst>
+          </p:cNvPr>
+          <p:cNvSpPr/>
+          <p:nvPr/>
+        </p:nvSpPr>
+        <p:spPr>
+          <a:xfrm>
+            <a:off x="6172200" y="6477000"/>
+            <a:ext cx="609600" cy="232048"/>
+          </a:xfrm>
+          <a:prstGeom prst="roundRect">
+            <a:avLst/>
+          </a:prstGeom>
+          <a:noFill/>
+          <a:ln w="12700">
+            <a:solidFill>
+              <a:schemeClr val="tx1"/>
+            </a:solidFill>
+          </a:ln>
+        </p:spPr>
+        <p:style>
+          <a:lnRef idx="2">
+            <a:schemeClr val="accent1">
+              <a:shade val="50000"/>
+            </a:schemeClr>
+          </a:lnRef>
+          <a:fillRef idx="1">
+            <a:schemeClr val="accent1"/>
+          </a:fillRef>
+          <a:effectRef idx="0">
+            <a:schemeClr val="accent1"/>
+          </a:effectRef>
+          <a:fontRef idx="minor">
+            <a:schemeClr val="lt1"/>
+          </a:fontRef>
+        </p:style>
+        <p:txBody>
+          <a:bodyPr wrap="square" lIns="45720" tIns="0" rIns="9144" bIns="0" rtlCol="0" anchor="t" anchorCtr="0"/>
+          <a:lstStyle/>
+          <a:p>
+            <a:r>
+              <a:rPr lang="en-US" sz="1400" dirty="0">
+                <a:solidFill>
+                  <a:schemeClr val="tx1"/>
+                </a:solidFill>
+              </a:rPr>
+              <a:t>WCAG</a:t>
+            </a:r>
+          </a:p>
+        </p:txBody>
+      </p:sp>
+      <p:sp>
+        <p:nvSpPr>
+          <p:cNvPr id="87" name="Rounded Rectangle 20">
+            <a:extLst>
+              <a:ext uri="{FF2B5EF4-FFF2-40B4-BE49-F238E27FC236}">
+                <a16:creationId xmlns:a16="http://schemas.microsoft.com/office/drawing/2014/main" id="{A6C93F65-9638-4176-BAE2-FCAB910C78B7}"/>
+              </a:ext>
+            </a:extLst>
+          </p:cNvPr>
+          <p:cNvSpPr/>
+          <p:nvPr/>
+        </p:nvSpPr>
+        <p:spPr>
+          <a:xfrm>
+            <a:off x="6858000" y="6477000"/>
+            <a:ext cx="990600" cy="228600"/>
+          </a:xfrm>
+          <a:prstGeom prst="roundRect">
+            <a:avLst/>
+          </a:prstGeom>
+          <a:noFill/>
+          <a:ln w="12700">
+            <a:solidFill>
+              <a:schemeClr val="tx1"/>
+            </a:solidFill>
+          </a:ln>
+        </p:spPr>
+        <p:style>
+          <a:lnRef idx="2">
+            <a:schemeClr val="accent1">
+              <a:shade val="50000"/>
+            </a:schemeClr>
+          </a:lnRef>
+          <a:fillRef idx="1">
+            <a:schemeClr val="accent1"/>
+          </a:fillRef>
+          <a:effectRef idx="0">
+            <a:schemeClr val="accent1"/>
+          </a:effectRef>
+          <a:fontRef idx="minor">
+            <a:schemeClr val="lt1"/>
+          </a:fontRef>
+        </p:style>
+        <p:txBody>
+          <a:bodyPr wrap="square" lIns="45720" tIns="0" rIns="9144" bIns="0" rtlCol="0" anchor="t" anchorCtr="0"/>
+          <a:lstStyle/>
+          <a:p>
+            <a:r>
+              <a:rPr lang="en-US" sz="1400" dirty="0">
+                <a:solidFill>
+                  <a:schemeClr val="tx1"/>
+                </a:solidFill>
+              </a:rPr>
+              <a:t>Section 508</a:t>
+            </a:r>
+          </a:p>
+        </p:txBody>
+      </p:sp>
+      <p:sp>
+        <p:nvSpPr>
+          <p:cNvPr id="88" name="Rounded Rectangle 20">
+            <a:extLst>
+              <a:ext uri="{FF2B5EF4-FFF2-40B4-BE49-F238E27FC236}">
+                <a16:creationId xmlns:a16="http://schemas.microsoft.com/office/drawing/2014/main" id="{A729C441-3FBA-4A8C-995C-AF02EB8E8225}"/>
+              </a:ext>
+            </a:extLst>
+          </p:cNvPr>
+          <p:cNvSpPr/>
+          <p:nvPr/>
+        </p:nvSpPr>
+        <p:spPr>
+          <a:xfrm>
+            <a:off x="7696200" y="6172200"/>
+            <a:ext cx="609600" cy="228600"/>
+          </a:xfrm>
+          <a:prstGeom prst="roundRect">
+            <a:avLst/>
+          </a:prstGeom>
+          <a:noFill/>
+          <a:ln w="12700">
+            <a:solidFill>
+              <a:schemeClr val="tx1"/>
+            </a:solidFill>
+          </a:ln>
+        </p:spPr>
+        <p:style>
+          <a:lnRef idx="2">
+            <a:schemeClr val="accent1">
+              <a:shade val="50000"/>
+            </a:schemeClr>
+          </a:lnRef>
+          <a:fillRef idx="1">
+            <a:schemeClr val="accent1"/>
+          </a:fillRef>
+          <a:effectRef idx="0">
+            <a:schemeClr val="accent1"/>
+          </a:effectRef>
+          <a:fontRef idx="minor">
+            <a:schemeClr val="lt1"/>
+          </a:fontRef>
+        </p:style>
+        <p:txBody>
+          <a:bodyPr wrap="square" lIns="45720" tIns="0" rIns="9144" bIns="0" rtlCol="0" anchor="t" anchorCtr="0"/>
+          <a:lstStyle/>
+          <a:p>
+            <a:r>
+              <a:rPr lang="en-US" sz="1400" dirty="0">
+                <a:solidFill>
+                  <a:schemeClr val="tx1"/>
+                </a:solidFill>
+              </a:rPr>
+              <a:t>FERPA</a:t>
+            </a:r>
+          </a:p>
+        </p:txBody>
+      </p:sp>
+      <p:sp>
+        <p:nvSpPr>
+          <p:cNvPr id="89" name="Rounded Rectangle 20">
+            <a:extLst>
+              <a:ext uri="{FF2B5EF4-FFF2-40B4-BE49-F238E27FC236}">
+                <a16:creationId xmlns:a16="http://schemas.microsoft.com/office/drawing/2014/main" id="{F9B6BBCD-6E58-4612-9596-B1DD23DDB1E6}"/>
+              </a:ext>
+            </a:extLst>
+          </p:cNvPr>
+          <p:cNvSpPr/>
+          <p:nvPr/>
+        </p:nvSpPr>
+        <p:spPr>
+          <a:xfrm>
+            <a:off x="4724400" y="1600200"/>
+            <a:ext cx="1143000" cy="3200400"/>
+          </a:xfrm>
+          <a:prstGeom prst="roundRect">
+            <a:avLst/>
+          </a:prstGeom>
+          <a:noFill/>
+          <a:ln w="12700">
+            <a:solidFill>
+              <a:schemeClr val="tx1"/>
+            </a:solidFill>
+          </a:ln>
+        </p:spPr>
+        <p:style>
+          <a:lnRef idx="2">
+            <a:schemeClr val="accent1">
+              <a:shade val="50000"/>
+            </a:schemeClr>
+          </a:lnRef>
+          <a:fillRef idx="1">
+            <a:schemeClr val="accent1"/>
+          </a:fillRef>
+          <a:effectRef idx="0">
+            <a:schemeClr val="accent1"/>
+          </a:effectRef>
+          <a:fontRef idx="minor">
+            <a:schemeClr val="lt1"/>
+          </a:fontRef>
+        </p:style>
+        <p:txBody>
+          <a:bodyPr wrap="square" lIns="45720" tIns="0" rIns="9144" bIns="0" rtlCol="0" anchor="t" anchorCtr="0"/>
+          <a:lstStyle/>
+          <a:p>
+            <a:r>
+              <a:rPr lang="en-US" sz="1400" dirty="0">
+                <a:solidFill>
+                  <a:schemeClr val="tx1"/>
+                </a:solidFill>
+              </a:rPr>
+              <a:t>CEDS</a:t>
+            </a:r>
+          </a:p>
+        </p:txBody>
+      </p:sp>
+      <p:sp>
+        <p:nvSpPr>
+          <p:cNvPr id="90" name="Rounded Rectangle 20">
+            <a:extLst>
+              <a:ext uri="{FF2B5EF4-FFF2-40B4-BE49-F238E27FC236}">
+                <a16:creationId xmlns:a16="http://schemas.microsoft.com/office/drawing/2014/main" id="{AA9A8B25-6FA1-41B0-8FAF-F731DF26F7F0}"/>
+              </a:ext>
+            </a:extLst>
+          </p:cNvPr>
+          <p:cNvSpPr/>
+          <p:nvPr/>
+        </p:nvSpPr>
+        <p:spPr>
+          <a:xfrm>
+            <a:off x="6248400" y="1752600"/>
+            <a:ext cx="914400" cy="1295400"/>
+          </a:xfrm>
+          <a:prstGeom prst="roundRect">
+            <a:avLst/>
+          </a:prstGeom>
+          <a:noFill/>
+          <a:ln w="12700">
+            <a:solidFill>
+              <a:schemeClr val="tx1"/>
+            </a:solidFill>
+          </a:ln>
+        </p:spPr>
+        <p:style>
+          <a:lnRef idx="2">
+            <a:schemeClr val="accent1">
+              <a:shade val="50000"/>
+            </a:schemeClr>
+          </a:lnRef>
+          <a:fillRef idx="1">
+            <a:schemeClr val="accent1"/>
+          </a:fillRef>
+          <a:effectRef idx="0">
+            <a:schemeClr val="accent1"/>
+          </a:effectRef>
+          <a:fontRef idx="minor">
+            <a:schemeClr val="lt1"/>
+          </a:fontRef>
+        </p:style>
+        <p:txBody>
+          <a:bodyPr wrap="square" lIns="45720" tIns="0" rIns="9144" bIns="0" rtlCol="0" anchor="b" anchorCtr="0"/>
+          <a:lstStyle/>
+          <a:p>
+            <a:r>
+              <a:rPr lang="en-US" sz="1400" dirty="0">
+                <a:solidFill>
+                  <a:schemeClr val="tx1"/>
+                </a:solidFill>
+              </a:rPr>
+              <a:t>SIF Data Model</a:t>
+            </a:r>
+          </a:p>
+        </p:txBody>
+      </p:sp>
+      <p:sp>
+        <p:nvSpPr>
+          <p:cNvPr id="91" name="Rounded Rectangle 20">
+            <a:extLst>
+              <a:ext uri="{FF2B5EF4-FFF2-40B4-BE49-F238E27FC236}">
+                <a16:creationId xmlns:a16="http://schemas.microsoft.com/office/drawing/2014/main" id="{3423DF10-1982-481C-BC2C-DC3B761F2E63}"/>
+              </a:ext>
+            </a:extLst>
+          </p:cNvPr>
+          <p:cNvSpPr/>
+          <p:nvPr/>
+        </p:nvSpPr>
+        <p:spPr>
+          <a:xfrm>
+            <a:off x="7277100" y="1638300"/>
+            <a:ext cx="990600" cy="228600"/>
+          </a:xfrm>
+          <a:prstGeom prst="roundRect">
+            <a:avLst/>
+          </a:prstGeom>
+          <a:noFill/>
+          <a:ln w="12700">
+            <a:solidFill>
+              <a:schemeClr val="tx1"/>
+            </a:solidFill>
+          </a:ln>
+        </p:spPr>
+        <p:style>
+          <a:lnRef idx="2">
+            <a:schemeClr val="accent1">
+              <a:shade val="50000"/>
+            </a:schemeClr>
+          </a:lnRef>
+          <a:fillRef idx="1">
+            <a:schemeClr val="accent1"/>
+          </a:fillRef>
+          <a:effectRef idx="0">
+            <a:schemeClr val="accent1"/>
+          </a:effectRef>
+          <a:fontRef idx="minor">
+            <a:schemeClr val="lt1"/>
+          </a:fontRef>
+        </p:style>
+        <p:txBody>
+          <a:bodyPr wrap="square" lIns="45720" tIns="0" rIns="9144" bIns="0" rtlCol="0" anchor="b" anchorCtr="0"/>
+          <a:lstStyle/>
+          <a:p>
+            <a:r>
+              <a:rPr lang="en-US" sz="1400" dirty="0">
+                <a:solidFill>
+                  <a:schemeClr val="tx1"/>
+                </a:solidFill>
+              </a:rPr>
+              <a:t>OneRoster</a:t>
+            </a:r>
+          </a:p>
+        </p:txBody>
+      </p:sp>
+      <p:sp>
+        <p:nvSpPr>
+          <p:cNvPr id="92" name="Rounded Rectangle 20">
+            <a:extLst>
+              <a:ext uri="{FF2B5EF4-FFF2-40B4-BE49-F238E27FC236}">
+                <a16:creationId xmlns:a16="http://schemas.microsoft.com/office/drawing/2014/main" id="{D49DFBEC-6FE5-453B-BA9D-EDBA997F7F85}"/>
+              </a:ext>
+            </a:extLst>
+          </p:cNvPr>
+          <p:cNvSpPr/>
+          <p:nvPr/>
+        </p:nvSpPr>
+        <p:spPr>
+          <a:xfrm>
+            <a:off x="7239000" y="1295400"/>
+            <a:ext cx="914400" cy="1752600"/>
+          </a:xfrm>
+          <a:prstGeom prst="roundRect">
+            <a:avLst/>
+          </a:prstGeom>
+          <a:noFill/>
+          <a:ln w="12700">
+            <a:solidFill>
+              <a:schemeClr val="tx1"/>
+            </a:solidFill>
+          </a:ln>
+        </p:spPr>
+        <p:style>
+          <a:lnRef idx="2">
+            <a:schemeClr val="accent1">
+              <a:shade val="50000"/>
+            </a:schemeClr>
+          </a:lnRef>
+          <a:fillRef idx="1">
+            <a:schemeClr val="accent1"/>
+          </a:fillRef>
+          <a:effectRef idx="0">
+            <a:schemeClr val="accent1"/>
+          </a:effectRef>
+          <a:fontRef idx="minor">
+            <a:schemeClr val="lt1"/>
+          </a:fontRef>
+        </p:style>
+        <p:txBody>
+          <a:bodyPr wrap="square" lIns="45720" tIns="0" rIns="9144" bIns="0" rtlCol="0" anchor="b" anchorCtr="0"/>
+          <a:lstStyle/>
+          <a:p>
+            <a:r>
+              <a:rPr lang="en-US" sz="1400" dirty="0">
+                <a:solidFill>
+                  <a:schemeClr val="tx1"/>
+                </a:solidFill>
+              </a:rPr>
+              <a:t>Ed-Fi</a:t>
+            </a:r>
+          </a:p>
+        </p:txBody>
+      </p:sp>
+      <p:sp>
+        <p:nvSpPr>
+          <p:cNvPr id="93" name="Rounded Rectangle 20">
+            <a:extLst>
+              <a:ext uri="{FF2B5EF4-FFF2-40B4-BE49-F238E27FC236}">
+                <a16:creationId xmlns:a16="http://schemas.microsoft.com/office/drawing/2014/main" id="{D05B7D5B-C3FF-4CD8-AEC3-13AD6C12055C}"/>
+              </a:ext>
+            </a:extLst>
+          </p:cNvPr>
+          <p:cNvSpPr/>
+          <p:nvPr/>
+        </p:nvSpPr>
+        <p:spPr>
+          <a:xfrm>
+            <a:off x="4953000" y="1905000"/>
+            <a:ext cx="3505200" cy="228600"/>
+          </a:xfrm>
+          <a:prstGeom prst="roundRect">
+            <a:avLst/>
+          </a:prstGeom>
+          <a:noFill/>
+          <a:ln w="12700">
+            <a:solidFill>
+              <a:schemeClr val="tx1"/>
+            </a:solidFill>
+          </a:ln>
+        </p:spPr>
+        <p:style>
+          <a:lnRef idx="2">
+            <a:schemeClr val="accent1">
+              <a:shade val="50000"/>
+            </a:schemeClr>
+          </a:lnRef>
+          <a:fillRef idx="1">
+            <a:schemeClr val="accent1"/>
+          </a:fillRef>
+          <a:effectRef idx="0">
+            <a:schemeClr val="accent1"/>
+          </a:effectRef>
+          <a:fontRef idx="minor">
+            <a:schemeClr val="lt1"/>
+          </a:fontRef>
+        </p:style>
+        <p:txBody>
+          <a:bodyPr wrap="square" lIns="45720" tIns="0" rIns="9144" bIns="0" rtlCol="0" anchor="b" anchorCtr="0"/>
+          <a:lstStyle/>
+          <a:p>
+            <a:r>
+              <a:rPr lang="en-US" sz="1400" dirty="0">
+                <a:solidFill>
+                  <a:schemeClr val="tx1"/>
+                </a:solidFill>
+              </a:rPr>
+              <a:t>PESC</a:t>
+            </a:r>
+          </a:p>
+        </p:txBody>
+      </p:sp>
+      <p:sp>
+        <p:nvSpPr>
+          <p:cNvPr id="94" name="Rounded Rectangle 20">
+            <a:extLst>
+              <a:ext uri="{FF2B5EF4-FFF2-40B4-BE49-F238E27FC236}">
+                <a16:creationId xmlns:a16="http://schemas.microsoft.com/office/drawing/2014/main" id="{3B1A9516-14CC-49DB-B856-2046579D4B6D}"/>
+              </a:ext>
+            </a:extLst>
+          </p:cNvPr>
+          <p:cNvSpPr/>
+          <p:nvPr/>
+        </p:nvSpPr>
+        <p:spPr>
+          <a:xfrm>
+            <a:off x="6553200" y="1447800"/>
+            <a:ext cx="457200" cy="228600"/>
+          </a:xfrm>
+          <a:prstGeom prst="roundRect">
+            <a:avLst/>
+          </a:prstGeom>
+          <a:noFill/>
+          <a:ln w="12700">
+            <a:solidFill>
+              <a:schemeClr val="tx1"/>
+            </a:solidFill>
+          </a:ln>
+        </p:spPr>
+        <p:style>
+          <a:lnRef idx="2">
+            <a:schemeClr val="accent1">
+              <a:shade val="50000"/>
+            </a:schemeClr>
+          </a:lnRef>
+          <a:fillRef idx="1">
+            <a:schemeClr val="accent1"/>
+          </a:fillRef>
+          <a:effectRef idx="0">
+            <a:schemeClr val="accent1"/>
+          </a:effectRef>
+          <a:fontRef idx="minor">
+            <a:schemeClr val="lt1"/>
+          </a:fontRef>
+        </p:style>
+        <p:txBody>
+          <a:bodyPr wrap="square" lIns="45720" tIns="0" rIns="9144" bIns="0" rtlCol="0" anchor="b" anchorCtr="0"/>
+          <a:lstStyle/>
+          <a:p>
+            <a:r>
+              <a:rPr lang="en-US" sz="1400" dirty="0">
+                <a:solidFill>
+                  <a:schemeClr val="tx1"/>
+                </a:solidFill>
+              </a:rPr>
+              <a:t>CLR</a:t>
+            </a:r>
+          </a:p>
+        </p:txBody>
+      </p:sp>
+      <p:sp>
+        <p:nvSpPr>
+          <p:cNvPr id="96" name="Rounded Rectangle 20">
+            <a:extLst>
+              <a:ext uri="{FF2B5EF4-FFF2-40B4-BE49-F238E27FC236}">
+                <a16:creationId xmlns:a16="http://schemas.microsoft.com/office/drawing/2014/main" id="{24CE8000-074B-4F8B-A537-8E80370E8884}"/>
+              </a:ext>
+            </a:extLst>
+          </p:cNvPr>
+          <p:cNvSpPr/>
+          <p:nvPr/>
+        </p:nvSpPr>
+        <p:spPr>
+          <a:xfrm>
+            <a:off x="4953000" y="3581400"/>
+            <a:ext cx="3352800" cy="228600"/>
+          </a:xfrm>
+          <a:prstGeom prst="roundRect">
+            <a:avLst/>
+          </a:prstGeom>
+          <a:noFill/>
+          <a:ln w="12700">
+            <a:solidFill>
+              <a:schemeClr val="tx1"/>
+            </a:solidFill>
+          </a:ln>
+        </p:spPr>
+        <p:style>
+          <a:lnRef idx="2">
+            <a:schemeClr val="accent1">
+              <a:shade val="50000"/>
+            </a:schemeClr>
+          </a:lnRef>
+          <a:fillRef idx="1">
+            <a:schemeClr val="accent1"/>
+          </a:fillRef>
+          <a:effectRef idx="0">
+            <a:schemeClr val="accent1"/>
+          </a:effectRef>
+          <a:fontRef idx="minor">
+            <a:schemeClr val="lt1"/>
+          </a:fontRef>
+        </p:style>
+        <p:txBody>
+          <a:bodyPr wrap="square" lIns="45720" tIns="0" rIns="9144" bIns="0" rtlCol="0" anchor="b" anchorCtr="0"/>
+          <a:lstStyle/>
+          <a:p>
+            <a:r>
+              <a:rPr lang="en-US" sz="1400" dirty="0">
+                <a:solidFill>
+                  <a:schemeClr val="tx1"/>
+                </a:solidFill>
+              </a:rPr>
+              <a:t>CASE</a:t>
+            </a:r>
+          </a:p>
+        </p:txBody>
+      </p:sp>
+      <p:sp>
+        <p:nvSpPr>
+          <p:cNvPr id="97" name="Rounded Rectangle 20">
+            <a:extLst>
+              <a:ext uri="{FF2B5EF4-FFF2-40B4-BE49-F238E27FC236}">
+                <a16:creationId xmlns:a16="http://schemas.microsoft.com/office/drawing/2014/main" id="{EFFC1F8D-7659-4E4C-8ED8-268BCE15328B}"/>
+              </a:ext>
+            </a:extLst>
+          </p:cNvPr>
+          <p:cNvSpPr/>
+          <p:nvPr/>
+        </p:nvSpPr>
+        <p:spPr>
+          <a:xfrm>
+            <a:off x="4876800" y="4495800"/>
+            <a:ext cx="1295400" cy="228600"/>
+          </a:xfrm>
+          <a:prstGeom prst="roundRect">
+            <a:avLst/>
+          </a:prstGeom>
+          <a:noFill/>
+          <a:ln w="12700">
+            <a:solidFill>
+              <a:schemeClr val="tx1"/>
+            </a:solidFill>
+          </a:ln>
+        </p:spPr>
+        <p:style>
+          <a:lnRef idx="2">
+            <a:schemeClr val="accent1">
+              <a:shade val="50000"/>
+            </a:schemeClr>
+          </a:lnRef>
+          <a:fillRef idx="1">
+            <a:schemeClr val="accent1"/>
+          </a:fillRef>
+          <a:effectRef idx="0">
+            <a:schemeClr val="accent1"/>
+          </a:effectRef>
+          <a:fontRef idx="minor">
+            <a:schemeClr val="lt1"/>
+          </a:fontRef>
+        </p:style>
+        <p:txBody>
+          <a:bodyPr wrap="square" lIns="45720" tIns="0" rIns="9144" bIns="0" rtlCol="0" anchor="b" anchorCtr="0"/>
+          <a:lstStyle/>
+          <a:p>
+            <a:r>
+              <a:rPr lang="en-US" sz="1400" dirty="0">
+                <a:solidFill>
+                  <a:schemeClr val="tx1"/>
+                </a:solidFill>
+              </a:rPr>
+              <a:t>LRMI</a:t>
+            </a:r>
+          </a:p>
+        </p:txBody>
+      </p:sp>
+      <p:sp>
+        <p:nvSpPr>
+          <p:cNvPr id="98" name="Rounded Rectangle 20">
+            <a:extLst>
+              <a:ext uri="{FF2B5EF4-FFF2-40B4-BE49-F238E27FC236}">
+                <a16:creationId xmlns:a16="http://schemas.microsoft.com/office/drawing/2014/main" id="{BD857C56-6251-4E53-B94F-4C73D3016756}"/>
+              </a:ext>
+            </a:extLst>
+          </p:cNvPr>
+          <p:cNvSpPr/>
+          <p:nvPr/>
+        </p:nvSpPr>
+        <p:spPr>
+          <a:xfrm>
+            <a:off x="4953000" y="4191000"/>
+            <a:ext cx="2286000" cy="228600"/>
+          </a:xfrm>
+          <a:prstGeom prst="roundRect">
+            <a:avLst/>
+          </a:prstGeom>
+          <a:noFill/>
+          <a:ln w="12700">
+            <a:solidFill>
+              <a:schemeClr val="tx1"/>
+            </a:solidFill>
+          </a:ln>
+        </p:spPr>
+        <p:style>
+          <a:lnRef idx="2">
+            <a:schemeClr val="accent1">
+              <a:shade val="50000"/>
+            </a:schemeClr>
+          </a:lnRef>
+          <a:fillRef idx="1">
+            <a:schemeClr val="accent1"/>
+          </a:fillRef>
+          <a:effectRef idx="0">
+            <a:schemeClr val="accent1"/>
+          </a:effectRef>
+          <a:fontRef idx="minor">
+            <a:schemeClr val="lt1"/>
+          </a:fontRef>
+        </p:style>
+        <p:txBody>
+          <a:bodyPr wrap="square" lIns="45720" tIns="0" rIns="9144" bIns="0" rtlCol="0" anchor="b" anchorCtr="0"/>
+          <a:lstStyle/>
+          <a:p>
+            <a:r>
+              <a:rPr lang="en-US" sz="1400" dirty="0">
+                <a:solidFill>
+                  <a:schemeClr val="tx1"/>
+                </a:solidFill>
+              </a:rPr>
+              <a:t>LOM</a:t>
+            </a:r>
+          </a:p>
+        </p:txBody>
+      </p:sp>
+      <p:sp>
+        <p:nvSpPr>
+          <p:cNvPr id="99" name="Rounded Rectangle 20">
+            <a:extLst>
+              <a:ext uri="{FF2B5EF4-FFF2-40B4-BE49-F238E27FC236}">
+                <a16:creationId xmlns:a16="http://schemas.microsoft.com/office/drawing/2014/main" id="{1F539371-2322-4CB9-B4C8-A23E1533AA95}"/>
+              </a:ext>
+            </a:extLst>
+          </p:cNvPr>
+          <p:cNvSpPr/>
+          <p:nvPr/>
+        </p:nvSpPr>
+        <p:spPr>
+          <a:xfrm>
+            <a:off x="4724400" y="4876800"/>
+            <a:ext cx="2286000" cy="228600"/>
+          </a:xfrm>
+          <a:prstGeom prst="roundRect">
+            <a:avLst/>
+          </a:prstGeom>
+          <a:noFill/>
+          <a:ln w="12700">
+            <a:solidFill>
+              <a:schemeClr val="tx1"/>
+            </a:solidFill>
+          </a:ln>
+        </p:spPr>
+        <p:style>
+          <a:lnRef idx="2">
+            <a:schemeClr val="accent1">
+              <a:shade val="50000"/>
+            </a:schemeClr>
+          </a:lnRef>
+          <a:fillRef idx="1">
+            <a:schemeClr val="accent1"/>
+          </a:fillRef>
+          <a:effectRef idx="0">
+            <a:schemeClr val="accent1"/>
+          </a:effectRef>
+          <a:fontRef idx="minor">
+            <a:schemeClr val="lt1"/>
+          </a:fontRef>
+        </p:style>
+        <p:txBody>
+          <a:bodyPr wrap="square" lIns="45720" tIns="0" rIns="9144" bIns="0" rtlCol="0" anchor="b" anchorCtr="0"/>
+          <a:lstStyle/>
+          <a:p>
+            <a:r>
+              <a:rPr lang="en-US" sz="1400" dirty="0">
+                <a:solidFill>
+                  <a:schemeClr val="tx1"/>
+                </a:solidFill>
+              </a:rPr>
+              <a:t>IMS: CP, CC, QTI</a:t>
+            </a:r>
+          </a:p>
+        </p:txBody>
+      </p:sp>
+      <p:sp>
+        <p:nvSpPr>
+          <p:cNvPr id="100" name="Rounded Rectangle 20">
+            <a:extLst>
+              <a:ext uri="{FF2B5EF4-FFF2-40B4-BE49-F238E27FC236}">
+                <a16:creationId xmlns:a16="http://schemas.microsoft.com/office/drawing/2014/main" id="{739B6D00-4F1B-4278-B24D-D04548078C77}"/>
+              </a:ext>
+            </a:extLst>
+          </p:cNvPr>
+          <p:cNvSpPr/>
+          <p:nvPr/>
+        </p:nvSpPr>
+        <p:spPr>
+          <a:xfrm>
+            <a:off x="5867400" y="5181600"/>
+            <a:ext cx="1371600" cy="228600"/>
+          </a:xfrm>
+          <a:prstGeom prst="roundRect">
+            <a:avLst/>
+          </a:prstGeom>
+          <a:noFill/>
+          <a:ln w="12700">
+            <a:solidFill>
+              <a:schemeClr val="tx1"/>
+            </a:solidFill>
+          </a:ln>
+        </p:spPr>
+        <p:style>
+          <a:lnRef idx="2">
+            <a:schemeClr val="accent1">
+              <a:shade val="50000"/>
+            </a:schemeClr>
+          </a:lnRef>
+          <a:fillRef idx="1">
+            <a:schemeClr val="accent1"/>
+          </a:fillRef>
+          <a:effectRef idx="0">
+            <a:schemeClr val="accent1"/>
+          </a:effectRef>
+          <a:fontRef idx="minor">
+            <a:schemeClr val="lt1"/>
+          </a:fontRef>
+        </p:style>
+        <p:txBody>
+          <a:bodyPr wrap="square" lIns="45720" tIns="0" rIns="9144" bIns="0" rtlCol="0" anchor="b" anchorCtr="0"/>
+          <a:lstStyle/>
+          <a:p>
+            <a:r>
+              <a:rPr lang="en-US" sz="1400" dirty="0">
+                <a:solidFill>
+                  <a:schemeClr val="tx1"/>
+                </a:solidFill>
+              </a:rPr>
+              <a:t>SCORM</a:t>
+            </a:r>
+          </a:p>
+        </p:txBody>
+      </p:sp>
+      <p:sp>
+        <p:nvSpPr>
+          <p:cNvPr id="101" name="Rounded Rectangle 20">
+            <a:extLst>
+              <a:ext uri="{FF2B5EF4-FFF2-40B4-BE49-F238E27FC236}">
+                <a16:creationId xmlns:a16="http://schemas.microsoft.com/office/drawing/2014/main" id="{70B9A7D4-53EA-44E3-8FFB-8B230E5E9AFB}"/>
+              </a:ext>
+            </a:extLst>
+          </p:cNvPr>
+          <p:cNvSpPr/>
+          <p:nvPr/>
+        </p:nvSpPr>
+        <p:spPr>
+          <a:xfrm>
+            <a:off x="7086600" y="4876800"/>
+            <a:ext cx="533400" cy="228600"/>
+          </a:xfrm>
+          <a:prstGeom prst="roundRect">
+            <a:avLst/>
+          </a:prstGeom>
+          <a:noFill/>
+          <a:ln w="12700">
+            <a:solidFill>
+              <a:schemeClr val="tx1"/>
+            </a:solidFill>
+          </a:ln>
+        </p:spPr>
+        <p:style>
+          <a:lnRef idx="2">
+            <a:schemeClr val="accent1">
+              <a:shade val="50000"/>
+            </a:schemeClr>
+          </a:lnRef>
+          <a:fillRef idx="1">
+            <a:schemeClr val="accent1"/>
+          </a:fillRef>
+          <a:effectRef idx="0">
+            <a:schemeClr val="accent1"/>
+          </a:effectRef>
+          <a:fontRef idx="minor">
+            <a:schemeClr val="lt1"/>
+          </a:fontRef>
+        </p:style>
+        <p:txBody>
+          <a:bodyPr wrap="square" lIns="45720" tIns="0" rIns="9144" bIns="0" rtlCol="0" anchor="b" anchorCtr="0"/>
+          <a:lstStyle/>
+          <a:p>
+            <a:r>
+              <a:rPr lang="en-US" sz="1400" dirty="0">
+                <a:solidFill>
+                  <a:schemeClr val="tx1"/>
+                </a:solidFill>
+              </a:rPr>
+              <a:t>EPUB</a:t>
+            </a:r>
+          </a:p>
+        </p:txBody>
+      </p:sp>
+      <p:sp>
+        <p:nvSpPr>
+          <p:cNvPr id="102" name="Rounded Rectangle 20">
+            <a:extLst>
+              <a:ext uri="{FF2B5EF4-FFF2-40B4-BE49-F238E27FC236}">
+                <a16:creationId xmlns:a16="http://schemas.microsoft.com/office/drawing/2014/main" id="{1580A863-6A34-46B2-9C0A-EFC99D3F71D0}"/>
+              </a:ext>
+            </a:extLst>
+          </p:cNvPr>
+          <p:cNvSpPr/>
+          <p:nvPr/>
+        </p:nvSpPr>
+        <p:spPr>
+          <a:xfrm>
+            <a:off x="8229600" y="1371600"/>
+            <a:ext cx="838200" cy="1752600"/>
+          </a:xfrm>
+          <a:prstGeom prst="roundRect">
+            <a:avLst/>
+          </a:prstGeom>
+          <a:noFill/>
+          <a:ln w="12700">
+            <a:solidFill>
+              <a:schemeClr val="tx1"/>
+            </a:solidFill>
+          </a:ln>
+        </p:spPr>
+        <p:style>
+          <a:lnRef idx="2">
+            <a:schemeClr val="accent1">
+              <a:shade val="50000"/>
+            </a:schemeClr>
+          </a:lnRef>
+          <a:fillRef idx="1">
+            <a:schemeClr val="accent1"/>
+          </a:fillRef>
+          <a:effectRef idx="0">
+            <a:schemeClr val="accent1"/>
+          </a:effectRef>
+          <a:fontRef idx="minor">
+            <a:schemeClr val="lt1"/>
+          </a:fontRef>
+        </p:style>
+        <p:txBody>
+          <a:bodyPr wrap="square" lIns="45720" tIns="0" rIns="9144" bIns="0" rtlCol="0" anchor="b" anchorCtr="0"/>
+          <a:lstStyle/>
+          <a:p>
+            <a:r>
+              <a:rPr lang="en-US" sz="1400" dirty="0">
+                <a:solidFill>
+                  <a:schemeClr val="tx1"/>
+                </a:solidFill>
+              </a:rPr>
+              <a:t>SIF</a:t>
+            </a:r>
+            <a:br>
+              <a:rPr lang="en-US" sz="1400" dirty="0">
+                <a:solidFill>
+                  <a:schemeClr val="tx1"/>
+                </a:solidFill>
+              </a:rPr>
+            </a:br>
+            <a:r>
+              <a:rPr lang="en-US" sz="1400" dirty="0">
+                <a:solidFill>
+                  <a:schemeClr val="tx1"/>
+                </a:solidFill>
+              </a:rPr>
+              <a:t>Infra-structure</a:t>
+            </a:r>
+          </a:p>
+        </p:txBody>
+      </p:sp>
+      <p:sp>
+        <p:nvSpPr>
+          <p:cNvPr id="103" name="Rounded Rectangle 20">
+            <a:extLst>
+              <a:ext uri="{FF2B5EF4-FFF2-40B4-BE49-F238E27FC236}">
+                <a16:creationId xmlns:a16="http://schemas.microsoft.com/office/drawing/2014/main" id="{7D3968B4-58C4-4F77-898A-B79C499CFBB8}"/>
+              </a:ext>
+            </a:extLst>
+          </p:cNvPr>
+          <p:cNvSpPr/>
+          <p:nvPr/>
+        </p:nvSpPr>
+        <p:spPr>
+          <a:xfrm>
+            <a:off x="8001000" y="4876800"/>
+            <a:ext cx="457200" cy="381000"/>
+          </a:xfrm>
+          <a:prstGeom prst="roundRect">
+            <a:avLst/>
+          </a:prstGeom>
+          <a:noFill/>
+          <a:ln w="12700">
+            <a:solidFill>
+              <a:schemeClr val="tx1"/>
+            </a:solidFill>
+          </a:ln>
+        </p:spPr>
+        <p:style>
+          <a:lnRef idx="2">
+            <a:schemeClr val="accent1">
+              <a:shade val="50000"/>
+            </a:schemeClr>
+          </a:lnRef>
+          <a:fillRef idx="1">
+            <a:schemeClr val="accent1"/>
+          </a:fillRef>
+          <a:effectRef idx="0">
+            <a:schemeClr val="accent1"/>
+          </a:effectRef>
+          <a:fontRef idx="minor">
+            <a:schemeClr val="lt1"/>
+          </a:fontRef>
+        </p:style>
+        <p:txBody>
+          <a:bodyPr wrap="square" lIns="45720" tIns="0" rIns="9144" bIns="0" rtlCol="0" anchor="t" anchorCtr="0"/>
+          <a:lstStyle/>
+          <a:p>
+            <a:r>
+              <a:rPr lang="en-US" sz="1400" dirty="0">
+                <a:solidFill>
+                  <a:schemeClr val="tx1"/>
+                </a:solidFill>
+              </a:rPr>
+              <a:t>LTI</a:t>
+            </a:r>
+          </a:p>
+        </p:txBody>
+      </p:sp>
+      <p:sp>
+        <p:nvSpPr>
+          <p:cNvPr id="104" name="Rounded Rectangle 20">
+            <a:extLst>
+              <a:ext uri="{FF2B5EF4-FFF2-40B4-BE49-F238E27FC236}">
+                <a16:creationId xmlns:a16="http://schemas.microsoft.com/office/drawing/2014/main" id="{D0964DA3-865A-4B31-ACA7-9472CB13EFE8}"/>
+              </a:ext>
+            </a:extLst>
+          </p:cNvPr>
+          <p:cNvSpPr/>
+          <p:nvPr/>
+        </p:nvSpPr>
+        <p:spPr>
+          <a:xfrm>
+            <a:off x="6553200" y="5486400"/>
+            <a:ext cx="457200" cy="228600"/>
+          </a:xfrm>
+          <a:prstGeom prst="roundRect">
+            <a:avLst/>
+          </a:prstGeom>
+          <a:noFill/>
+          <a:ln w="12700">
+            <a:solidFill>
+              <a:schemeClr val="tx1"/>
+            </a:solidFill>
+          </a:ln>
+        </p:spPr>
+        <p:style>
+          <a:lnRef idx="2">
+            <a:schemeClr val="accent1">
+              <a:shade val="50000"/>
+            </a:schemeClr>
+          </a:lnRef>
+          <a:fillRef idx="1">
+            <a:schemeClr val="accent1"/>
+          </a:fillRef>
+          <a:effectRef idx="0">
+            <a:schemeClr val="accent1"/>
+          </a:effectRef>
+          <a:fontRef idx="minor">
+            <a:schemeClr val="lt1"/>
+          </a:fontRef>
+        </p:style>
+        <p:txBody>
+          <a:bodyPr wrap="square" lIns="45720" tIns="0" rIns="9144" bIns="0" rtlCol="0" anchor="b" anchorCtr="0"/>
+          <a:lstStyle/>
+          <a:p>
+            <a:r>
+              <a:rPr lang="en-US" sz="1400" dirty="0">
+                <a:solidFill>
+                  <a:schemeClr val="tx1"/>
+                </a:solidFill>
+              </a:rPr>
+              <a:t>XML</a:t>
+            </a:r>
+          </a:p>
+        </p:txBody>
+      </p:sp>
+      <p:sp>
+        <p:nvSpPr>
+          <p:cNvPr id="105" name="Rounded Rectangle 20">
+            <a:extLst>
+              <a:ext uri="{FF2B5EF4-FFF2-40B4-BE49-F238E27FC236}">
+                <a16:creationId xmlns:a16="http://schemas.microsoft.com/office/drawing/2014/main" id="{A8E7D5D8-E315-4527-BE1F-BCAC11DED96D}"/>
+              </a:ext>
+            </a:extLst>
+          </p:cNvPr>
+          <p:cNvSpPr/>
+          <p:nvPr/>
+        </p:nvSpPr>
+        <p:spPr>
+          <a:xfrm>
+            <a:off x="7086600" y="5486400"/>
+            <a:ext cx="533400" cy="228600"/>
+          </a:xfrm>
+          <a:prstGeom prst="roundRect">
+            <a:avLst/>
+          </a:prstGeom>
+          <a:noFill/>
+          <a:ln w="12700">
+            <a:solidFill>
+              <a:schemeClr val="tx1"/>
+            </a:solidFill>
+          </a:ln>
+        </p:spPr>
+        <p:style>
+          <a:lnRef idx="2">
+            <a:schemeClr val="accent1">
+              <a:shade val="50000"/>
+            </a:schemeClr>
+          </a:lnRef>
+          <a:fillRef idx="1">
+            <a:schemeClr val="accent1"/>
+          </a:fillRef>
+          <a:effectRef idx="0">
+            <a:schemeClr val="accent1"/>
+          </a:effectRef>
+          <a:fontRef idx="minor">
+            <a:schemeClr val="lt1"/>
+          </a:fontRef>
+        </p:style>
+        <p:txBody>
+          <a:bodyPr wrap="square" lIns="45720" tIns="0" rIns="9144" bIns="0" rtlCol="0" anchor="b" anchorCtr="0"/>
+          <a:lstStyle/>
+          <a:p>
+            <a:r>
+              <a:rPr lang="en-US" sz="1400" dirty="0">
+                <a:solidFill>
+                  <a:schemeClr val="tx1"/>
+                </a:solidFill>
+              </a:rPr>
+              <a:t>HTML</a:t>
+            </a:r>
+          </a:p>
+        </p:txBody>
+      </p:sp>
+      <p:sp>
+        <p:nvSpPr>
+          <p:cNvPr id="106" name="Rounded Rectangle 20">
+            <a:extLst>
+              <a:ext uri="{FF2B5EF4-FFF2-40B4-BE49-F238E27FC236}">
+                <a16:creationId xmlns:a16="http://schemas.microsoft.com/office/drawing/2014/main" id="{A33E9B70-19D8-47A0-B8CB-27FF07123881}"/>
+              </a:ext>
+            </a:extLst>
+          </p:cNvPr>
+          <p:cNvSpPr/>
+          <p:nvPr/>
+        </p:nvSpPr>
+        <p:spPr>
+          <a:xfrm>
+            <a:off x="6553200" y="5791200"/>
+            <a:ext cx="533400" cy="228600"/>
+          </a:xfrm>
+          <a:prstGeom prst="roundRect">
+            <a:avLst/>
+          </a:prstGeom>
+          <a:noFill/>
+          <a:ln w="12700">
+            <a:solidFill>
+              <a:schemeClr val="tx1"/>
+            </a:solidFill>
+          </a:ln>
+        </p:spPr>
+        <p:style>
+          <a:lnRef idx="2">
+            <a:schemeClr val="accent1">
+              <a:shade val="50000"/>
+            </a:schemeClr>
+          </a:lnRef>
+          <a:fillRef idx="1">
+            <a:schemeClr val="accent1"/>
+          </a:fillRef>
+          <a:effectRef idx="0">
+            <a:schemeClr val="accent1"/>
+          </a:effectRef>
+          <a:fontRef idx="minor">
+            <a:schemeClr val="lt1"/>
+          </a:fontRef>
+        </p:style>
+        <p:txBody>
+          <a:bodyPr wrap="square" lIns="45720" tIns="0" rIns="9144" bIns="0" rtlCol="0" anchor="b" anchorCtr="0"/>
+          <a:lstStyle/>
+          <a:p>
+            <a:r>
+              <a:rPr lang="en-US" sz="1400" dirty="0">
+                <a:solidFill>
+                  <a:schemeClr val="tx1"/>
+                </a:solidFill>
+              </a:rPr>
+              <a:t>JSON</a:t>
+            </a:r>
+          </a:p>
+        </p:txBody>
+      </p:sp>
+      <p:sp>
+        <p:nvSpPr>
+          <p:cNvPr id="107" name="Rounded Rectangle 20">
+            <a:extLst>
+              <a:ext uri="{FF2B5EF4-FFF2-40B4-BE49-F238E27FC236}">
+                <a16:creationId xmlns:a16="http://schemas.microsoft.com/office/drawing/2014/main" id="{1018090B-324B-4FDE-8D67-CE98218AC75C}"/>
+              </a:ext>
+            </a:extLst>
+          </p:cNvPr>
+          <p:cNvSpPr/>
+          <p:nvPr/>
+        </p:nvSpPr>
+        <p:spPr>
+          <a:xfrm>
+            <a:off x="7772400" y="5715000"/>
+            <a:ext cx="533400" cy="228600"/>
+          </a:xfrm>
+          <a:prstGeom prst="roundRect">
+            <a:avLst/>
+          </a:prstGeom>
+          <a:noFill/>
+          <a:ln w="12700">
+            <a:solidFill>
+              <a:schemeClr val="tx1"/>
+            </a:solidFill>
+          </a:ln>
+        </p:spPr>
+        <p:style>
+          <a:lnRef idx="2">
+            <a:schemeClr val="accent1">
+              <a:shade val="50000"/>
+            </a:schemeClr>
+          </a:lnRef>
+          <a:fillRef idx="1">
+            <a:schemeClr val="accent1"/>
+          </a:fillRef>
+          <a:effectRef idx="0">
+            <a:schemeClr val="accent1"/>
+          </a:effectRef>
+          <a:fontRef idx="minor">
+            <a:schemeClr val="lt1"/>
+          </a:fontRef>
+        </p:style>
+        <p:txBody>
+          <a:bodyPr wrap="square" lIns="45720" tIns="0" rIns="9144" bIns="0" rtlCol="0" anchor="b" anchorCtr="0"/>
+          <a:lstStyle/>
+          <a:p>
+            <a:r>
+              <a:rPr lang="en-US" sz="1400" dirty="0">
+                <a:solidFill>
+                  <a:schemeClr val="tx1"/>
+                </a:solidFill>
+              </a:rPr>
+              <a:t>HTTP</a:t>
+            </a:r>
+          </a:p>
+        </p:txBody>
+      </p:sp>
+      <p:sp>
+        <p:nvSpPr>
+          <p:cNvPr id="108" name="Rounded Rectangle 20">
+            <a:extLst>
+              <a:ext uri="{FF2B5EF4-FFF2-40B4-BE49-F238E27FC236}">
+                <a16:creationId xmlns:a16="http://schemas.microsoft.com/office/drawing/2014/main" id="{B8B78ADE-9402-44E6-939C-0D985EAFCE08}"/>
+              </a:ext>
+            </a:extLst>
+          </p:cNvPr>
+          <p:cNvSpPr/>
+          <p:nvPr/>
+        </p:nvSpPr>
+        <p:spPr>
+          <a:xfrm>
+            <a:off x="8382000" y="5791200"/>
+            <a:ext cx="381000" cy="228600"/>
+          </a:xfrm>
+          <a:prstGeom prst="roundRect">
+            <a:avLst/>
+          </a:prstGeom>
+          <a:noFill/>
+          <a:ln w="12700">
+            <a:solidFill>
+              <a:schemeClr val="tx1"/>
+            </a:solidFill>
+          </a:ln>
+        </p:spPr>
+        <p:style>
+          <a:lnRef idx="2">
+            <a:schemeClr val="accent1">
+              <a:shade val="50000"/>
+            </a:schemeClr>
+          </a:lnRef>
+          <a:fillRef idx="1">
+            <a:schemeClr val="accent1"/>
+          </a:fillRef>
+          <a:effectRef idx="0">
+            <a:schemeClr val="accent1"/>
+          </a:effectRef>
+          <a:fontRef idx="minor">
+            <a:schemeClr val="lt1"/>
+          </a:fontRef>
+        </p:style>
+        <p:txBody>
+          <a:bodyPr wrap="square" lIns="45720" tIns="0" rIns="9144" bIns="0" rtlCol="0" anchor="b" anchorCtr="0"/>
+          <a:lstStyle/>
+          <a:p>
+            <a:r>
+              <a:rPr lang="en-US" sz="1400" dirty="0">
+                <a:solidFill>
+                  <a:schemeClr val="tx1"/>
+                </a:solidFill>
+              </a:rPr>
+              <a:t>EDI</a:t>
+            </a:r>
+          </a:p>
+        </p:txBody>
+      </p:sp>
+      <p:sp>
+        <p:nvSpPr>
+          <p:cNvPr id="110" name="Rounded Rectangle 20">
+            <a:extLst>
+              <a:ext uri="{FF2B5EF4-FFF2-40B4-BE49-F238E27FC236}">
+                <a16:creationId xmlns:a16="http://schemas.microsoft.com/office/drawing/2014/main" id="{E88096CA-1C43-4ED6-91AD-E326ADDD05A2}"/>
+              </a:ext>
+            </a:extLst>
+          </p:cNvPr>
+          <p:cNvSpPr/>
+          <p:nvPr/>
+        </p:nvSpPr>
+        <p:spPr>
+          <a:xfrm>
+            <a:off x="7467600" y="1371600"/>
+            <a:ext cx="609600" cy="228600"/>
+          </a:xfrm>
+          <a:prstGeom prst="roundRect">
+            <a:avLst/>
+          </a:prstGeom>
+          <a:noFill/>
+          <a:ln w="12700">
+            <a:solidFill>
+              <a:schemeClr val="tx1"/>
+            </a:solidFill>
+          </a:ln>
+        </p:spPr>
+        <p:style>
+          <a:lnRef idx="2">
+            <a:schemeClr val="accent1">
+              <a:shade val="50000"/>
+            </a:schemeClr>
+          </a:lnRef>
+          <a:fillRef idx="1">
+            <a:schemeClr val="accent1"/>
+          </a:fillRef>
+          <a:effectRef idx="0">
+            <a:schemeClr val="accent1"/>
+          </a:effectRef>
+          <a:fontRef idx="minor">
+            <a:schemeClr val="lt1"/>
+          </a:fontRef>
+        </p:style>
+        <p:txBody>
+          <a:bodyPr wrap="square" lIns="45720" tIns="0" rIns="9144" bIns="0" rtlCol="0" anchor="b" anchorCtr="0"/>
+          <a:lstStyle/>
+          <a:p>
+            <a:r>
+              <a:rPr lang="en-US" sz="1400" dirty="0">
+                <a:solidFill>
+                  <a:schemeClr val="tx1"/>
+                </a:solidFill>
+              </a:rPr>
+              <a:t>OBI</a:t>
+            </a:r>
+          </a:p>
+        </p:txBody>
+      </p:sp>
+      <p:sp>
+        <p:nvSpPr>
+          <p:cNvPr id="111" name="Rounded Rectangle 20">
+            <a:extLst>
+              <a:ext uri="{FF2B5EF4-FFF2-40B4-BE49-F238E27FC236}">
+                <a16:creationId xmlns:a16="http://schemas.microsoft.com/office/drawing/2014/main" id="{2A4E9081-7625-432F-B34D-35F15986B367}"/>
+              </a:ext>
+            </a:extLst>
+          </p:cNvPr>
+          <p:cNvSpPr/>
+          <p:nvPr/>
+        </p:nvSpPr>
+        <p:spPr>
+          <a:xfrm>
+            <a:off x="8534400" y="1752600"/>
+            <a:ext cx="457200" cy="228600"/>
+          </a:xfrm>
+          <a:prstGeom prst="roundRect">
+            <a:avLst/>
+          </a:prstGeom>
+          <a:noFill/>
+          <a:ln w="12700">
+            <a:solidFill>
+              <a:schemeClr val="tx1"/>
+            </a:solidFill>
+          </a:ln>
+        </p:spPr>
+        <p:style>
+          <a:lnRef idx="2">
+            <a:schemeClr val="accent1">
+              <a:shade val="50000"/>
+            </a:schemeClr>
+          </a:lnRef>
+          <a:fillRef idx="1">
+            <a:schemeClr val="accent1"/>
+          </a:fillRef>
+          <a:effectRef idx="0">
+            <a:schemeClr val="accent1"/>
+          </a:effectRef>
+          <a:fontRef idx="minor">
+            <a:schemeClr val="lt1"/>
+          </a:fontRef>
+        </p:style>
+        <p:txBody>
+          <a:bodyPr wrap="square" lIns="45720" tIns="0" rIns="9144" bIns="0" rtlCol="0" anchor="b" anchorCtr="0"/>
+          <a:lstStyle/>
+          <a:p>
+            <a:r>
+              <a:rPr lang="en-US" sz="1400" dirty="0">
+                <a:solidFill>
+                  <a:schemeClr val="tx1"/>
+                </a:solidFill>
+              </a:rPr>
+              <a:t>xAPI</a:t>
+            </a:r>
+          </a:p>
+        </p:txBody>
+      </p:sp>
+      <p:sp>
+        <p:nvSpPr>
+          <p:cNvPr id="112" name="Rounded Rectangle 20">
+            <a:extLst>
+              <a:ext uri="{FF2B5EF4-FFF2-40B4-BE49-F238E27FC236}">
+                <a16:creationId xmlns:a16="http://schemas.microsoft.com/office/drawing/2014/main" id="{A545CE53-985D-4171-83E2-8548D64DF6F7}"/>
+              </a:ext>
+            </a:extLst>
+          </p:cNvPr>
+          <p:cNvSpPr/>
+          <p:nvPr/>
+        </p:nvSpPr>
+        <p:spPr>
+          <a:xfrm>
+            <a:off x="8305800" y="1447800"/>
+            <a:ext cx="685800" cy="228600"/>
+          </a:xfrm>
+          <a:prstGeom prst="roundRect">
+            <a:avLst/>
+          </a:prstGeom>
+          <a:noFill/>
+          <a:ln w="12700">
+            <a:solidFill>
+              <a:schemeClr val="tx1"/>
+            </a:solidFill>
+          </a:ln>
+        </p:spPr>
+        <p:style>
+          <a:lnRef idx="2">
+            <a:schemeClr val="accent1">
+              <a:shade val="50000"/>
+            </a:schemeClr>
+          </a:lnRef>
+          <a:fillRef idx="1">
+            <a:schemeClr val="accent1"/>
+          </a:fillRef>
+          <a:effectRef idx="0">
+            <a:schemeClr val="accent1"/>
+          </a:effectRef>
+          <a:fontRef idx="minor">
+            <a:schemeClr val="lt1"/>
+          </a:fontRef>
+        </p:style>
+        <p:txBody>
+          <a:bodyPr wrap="square" lIns="45720" tIns="0" rIns="9144" bIns="0" rtlCol="0" anchor="b" anchorCtr="0"/>
+          <a:lstStyle/>
+          <a:p>
+            <a:r>
+              <a:rPr lang="en-US" sz="1400" dirty="0">
+                <a:solidFill>
+                  <a:schemeClr val="tx1"/>
+                </a:solidFill>
+              </a:rPr>
+              <a:t>Caliper</a:t>
+            </a:r>
+          </a:p>
+        </p:txBody>
+      </p:sp>
+      <p:sp>
+        <p:nvSpPr>
+          <p:cNvPr id="53" name="TextBox 52">
+            <a:extLst>
+              <a:ext uri="{FF2B5EF4-FFF2-40B4-BE49-F238E27FC236}">
+                <a16:creationId xmlns:a16="http://schemas.microsoft.com/office/drawing/2014/main" id="{B4A0767D-58AE-4710-B0D3-751A4E363A4A}"/>
+              </a:ext>
+            </a:extLst>
+          </p:cNvPr>
+          <p:cNvSpPr txBox="1"/>
+          <p:nvPr/>
+        </p:nvSpPr>
+        <p:spPr>
+          <a:xfrm>
+            <a:off x="533400" y="457200"/>
+            <a:ext cx="3498715" cy="523220"/>
+          </a:xfrm>
+          <a:prstGeom prst="rect">
+            <a:avLst/>
+          </a:prstGeom>
+          <a:noFill/>
+        </p:spPr>
+        <p:txBody>
+          <a:bodyPr wrap="none" rtlCol="0">
+            <a:spAutoFit/>
+          </a:bodyPr>
+          <a:lstStyle/>
+          <a:p>
+            <a:r>
+              <a:rPr lang="en-US" sz="2800" b="1" dirty="0"/>
+              <a:t>Educational Standards</a:t>
+            </a:r>
+          </a:p>
+        </p:txBody>
+      </p:sp>
+    </p:spTree>
+    <p:extLst>
+      <p:ext uri="{BB962C8B-B14F-4D97-AF65-F5344CB8AC3E}">
+        <p14:creationId xmlns:p14="http://schemas.microsoft.com/office/powerpoint/2010/main" val="907942164"/>
+      </p:ext>
+    </p:extLst>
+  </p:cSld>
+  <p:clrMapOvr>
+    <a:masterClrMapping/>
+  </p:clrMapOvr>
+</p:sld>
+</file>
+
+<file path=ppt/slides/slide4.xml><?xml version="1.0" encoding="utf-8"?>
+<p:sld xmlns:a="http://schemas.openxmlformats.org/drawingml/2006/main" xmlns:r="http://schemas.openxmlformats.org/officeDocument/2006/relationships" xmlns:p="http://schemas.openxmlformats.org/presentationml/2006/main">
+  <p:cSld>
+    <p:spTree>
+      <p:nvGrpSpPr>
+        <p:cNvPr id="1" name=""/>
+        <p:cNvGrpSpPr/>
+        <p:nvPr/>
+      </p:nvGrpSpPr>
+      <p:grpSpPr>
+        <a:xfrm>
+          <a:off x="0" y="0"/>
+          <a:ext cx="0" cy="0"/>
+          <a:chOff x="0" y="0"/>
+          <a:chExt cx="0" cy="0"/>
+        </a:xfrm>
+      </p:grpSpPr>
+      <p:sp>
+        <p:nvSpPr>
+          <p:cNvPr id="72" name="Rectangle 71">
+            <a:extLst>
+              <a:ext uri="{FF2B5EF4-FFF2-40B4-BE49-F238E27FC236}">
+                <a16:creationId xmlns:a16="http://schemas.microsoft.com/office/drawing/2014/main" id="{88AD68B1-5340-47AD-9371-1C8AA9D6C102}"/>
+              </a:ext>
+            </a:extLst>
+          </p:cNvPr>
+          <p:cNvSpPr/>
+          <p:nvPr/>
+        </p:nvSpPr>
+        <p:spPr>
+          <a:xfrm>
             <a:off x="1143000" y="5486400"/>
             <a:ext cx="2971800" cy="685800"/>
           </a:xfrm>
@@ -11672,7 +14989,7 @@
 </p:sld>
 </file>
 
-<file path=ppt/slides/slide4.xml><?xml version="1.0" encoding="utf-8"?>
+<file path=ppt/slides/slide5.xml><?xml version="1.0" encoding="utf-8"?>
 <p:sld xmlns:a="http://schemas.openxmlformats.org/drawingml/2006/main" xmlns:r="http://schemas.openxmlformats.org/officeDocument/2006/relationships" xmlns:p="http://schemas.openxmlformats.org/presentationml/2006/main">
   <p:cSld>
     <p:spTree>

</xml_diff>